<commit_message>
added link for new VC slides
</commit_message>
<xml_diff>
--- a/Wi22_content/SEDS/L3.Version_Control.pptx
+++ b/Wi22_content/SEDS/L3.Version_Control.pptx
@@ -5,39 +5,38 @@
     <p:sldMasterId id="2147483648" r:id="rId1"/>
   </p:sldMasterIdLst>
   <p:notesMasterIdLst>
-    <p:notesMasterId r:id="rId32"/>
+    <p:notesMasterId r:id="rId31"/>
   </p:notesMasterIdLst>
   <p:sldIdLst>
     <p:sldId id="256" r:id="rId2"/>
     <p:sldId id="296" r:id="rId3"/>
-    <p:sldId id="299" r:id="rId4"/>
-    <p:sldId id="298" r:id="rId5"/>
-    <p:sldId id="300" r:id="rId6"/>
-    <p:sldId id="282" r:id="rId7"/>
-    <p:sldId id="285" r:id="rId8"/>
-    <p:sldId id="283" r:id="rId9"/>
-    <p:sldId id="284" r:id="rId10"/>
-    <p:sldId id="287" r:id="rId11"/>
-    <p:sldId id="288" r:id="rId12"/>
-    <p:sldId id="289" r:id="rId13"/>
-    <p:sldId id="290" r:id="rId14"/>
-    <p:sldId id="291" r:id="rId15"/>
-    <p:sldId id="292" r:id="rId16"/>
-    <p:sldId id="293" r:id="rId17"/>
-    <p:sldId id="297" r:id="rId18"/>
-    <p:sldId id="269" r:id="rId19"/>
-    <p:sldId id="270" r:id="rId20"/>
-    <p:sldId id="271" r:id="rId21"/>
-    <p:sldId id="272" r:id="rId22"/>
-    <p:sldId id="273" r:id="rId23"/>
-    <p:sldId id="274" r:id="rId24"/>
-    <p:sldId id="275" r:id="rId25"/>
-    <p:sldId id="276" r:id="rId26"/>
-    <p:sldId id="277" r:id="rId27"/>
-    <p:sldId id="278" r:id="rId28"/>
-    <p:sldId id="279" r:id="rId29"/>
-    <p:sldId id="280" r:id="rId30"/>
-    <p:sldId id="294" r:id="rId31"/>
+    <p:sldId id="298" r:id="rId4"/>
+    <p:sldId id="300" r:id="rId5"/>
+    <p:sldId id="282" r:id="rId6"/>
+    <p:sldId id="285" r:id="rId7"/>
+    <p:sldId id="283" r:id="rId8"/>
+    <p:sldId id="284" r:id="rId9"/>
+    <p:sldId id="287" r:id="rId10"/>
+    <p:sldId id="288" r:id="rId11"/>
+    <p:sldId id="289" r:id="rId12"/>
+    <p:sldId id="290" r:id="rId13"/>
+    <p:sldId id="291" r:id="rId14"/>
+    <p:sldId id="292" r:id="rId15"/>
+    <p:sldId id="293" r:id="rId16"/>
+    <p:sldId id="297" r:id="rId17"/>
+    <p:sldId id="269" r:id="rId18"/>
+    <p:sldId id="270" r:id="rId19"/>
+    <p:sldId id="271" r:id="rId20"/>
+    <p:sldId id="272" r:id="rId21"/>
+    <p:sldId id="273" r:id="rId22"/>
+    <p:sldId id="274" r:id="rId23"/>
+    <p:sldId id="275" r:id="rId24"/>
+    <p:sldId id="276" r:id="rId25"/>
+    <p:sldId id="277" r:id="rId26"/>
+    <p:sldId id="278" r:id="rId27"/>
+    <p:sldId id="279" r:id="rId28"/>
+    <p:sldId id="280" r:id="rId29"/>
+    <p:sldId id="294" r:id="rId30"/>
   </p:sldIdLst>
   <p:sldSz cx="9144000" cy="6858000" type="screen4x3"/>
   <p:notesSz cx="6858000" cy="9144000"/>
@@ -157,18 +156,10 @@
 
 <file path=ppt/commentAuthors.xml><?xml version="1.0" encoding="utf-8"?>
 <p:cmAuthorLst xmlns:a="http://schemas.openxmlformats.org/drawingml/2006/main" xmlns:r="http://schemas.openxmlformats.org/officeDocument/2006/relationships" xmlns:p="http://schemas.openxmlformats.org/presentationml/2006/main">
-  <p:cmAuthor id="1" name="David A. Beck" initials="DAB" lastIdx="1" clrIdx="0">
-    <p:extLst/>
-  </p:cmAuthor>
-  <p:cmAuthor id="2" name="David A. Beck" initials="DAB [2]" lastIdx="1" clrIdx="1">
-    <p:extLst/>
-  </p:cmAuthor>
-  <p:cmAuthor id="3" name="David A. Beck" initials="DAB [2] [2]" lastIdx="1" clrIdx="2">
-    <p:extLst/>
-  </p:cmAuthor>
-  <p:cmAuthor id="4" name="David A. Beck" initials="DAB [3]" lastIdx="1" clrIdx="3">
-    <p:extLst/>
-  </p:cmAuthor>
+  <p:cmAuthor id="1" name="David A. Beck" initials="DAB" lastIdx="1" clrIdx="0"/>
+  <p:cmAuthor id="2" name="David A. Beck" initials="DAB [2]" lastIdx="1" clrIdx="1"/>
+  <p:cmAuthor id="3" name="David A. Beck" initials="DAB [2] [2]" lastIdx="1" clrIdx="2"/>
+  <p:cmAuthor id="4" name="David A. Beck" initials="DAB [3]" lastIdx="1" clrIdx="3"/>
 </p:cmAuthorLst>
 </file>
 
@@ -254,7 +245,7 @@
           <a:p>
             <a:fld id="{08F62E20-B1AA-3442-B8F1-F4A56998389D}" type="datetimeFigureOut">
               <a:rPr lang="en-US" smtClean="0"/>
-              <a:t>1/12/21</a:t>
+              <a:t>1/11/2022</a:t>
             </a:fld>
             <a:endParaRPr lang="en-US"/>
           </a:p>
@@ -653,7 +644,7 @@
               <a:pPr>
                 <a:defRPr/>
               </a:pPr>
-              <a:t>26</a:t>
+              <a:t>25</a:t>
             </a:fld>
             <a:endParaRPr lang="en-US"/>
           </a:p>
@@ -680,7 +671,7 @@
           <a:ln/>
           <a:extLst>
             <a:ext uri="{AF507438-7753-43e0-B8FC-AC1667EBCBE1}">
-              <a14:hiddenEffects xmlns="" xmlns:a14="http://schemas.microsoft.com/office/drawing/2010/main">
+              <a14:hiddenEffects xmlns:a14="http://schemas.microsoft.com/office/drawing/2010/main" xmlns="">
                 <a:effectLst>
                   <a:outerShdw blurRad="63500" dist="38099" dir="2700000" algn="ctr" rotWithShape="0">
                     <a:srgbClr val="000000">
@@ -711,7 +702,7 @@
           <a:ln/>
           <a:extLst>
             <a:ext uri="{AF507438-7753-43e0-B8FC-AC1667EBCBE1}">
-              <a14:hiddenEffects xmlns="" xmlns:a14="http://schemas.microsoft.com/office/drawing/2010/main">
+              <a14:hiddenEffects xmlns:a14="http://schemas.microsoft.com/office/drawing/2010/main" xmlns="">
                 <a:effectLst>
                   <a:outerShdw blurRad="63500" dist="38099" dir="2700000" algn="ctr" rotWithShape="0">
                     <a:srgbClr val="000000">
@@ -797,7 +788,7 @@
               <a:pPr>
                 <a:defRPr/>
               </a:pPr>
-              <a:t>27</a:t>
+              <a:t>26</a:t>
             </a:fld>
             <a:endParaRPr lang="en-US"/>
           </a:p>
@@ -824,7 +815,7 @@
           <a:ln/>
           <a:extLst>
             <a:ext uri="{AF507438-7753-43e0-B8FC-AC1667EBCBE1}">
-              <a14:hiddenEffects xmlns="" xmlns:a14="http://schemas.microsoft.com/office/drawing/2010/main">
+              <a14:hiddenEffects xmlns:a14="http://schemas.microsoft.com/office/drawing/2010/main" xmlns="">
                 <a:effectLst>
                   <a:outerShdw blurRad="63500" dist="38099" dir="2700000" algn="ctr" rotWithShape="0">
                     <a:srgbClr val="000000">
@@ -855,7 +846,7 @@
           <a:ln/>
           <a:extLst>
             <a:ext uri="{AF507438-7753-43e0-B8FC-AC1667EBCBE1}">
-              <a14:hiddenEffects xmlns="" xmlns:a14="http://schemas.microsoft.com/office/drawing/2010/main">
+              <a14:hiddenEffects xmlns:a14="http://schemas.microsoft.com/office/drawing/2010/main" xmlns="">
                 <a:effectLst>
                   <a:outerShdw blurRad="63500" dist="38099" dir="2700000" algn="ctr" rotWithShape="0">
                     <a:srgbClr val="000000">
@@ -941,7 +932,7 @@
               <a:pPr>
                 <a:defRPr/>
               </a:pPr>
-              <a:t>28</a:t>
+              <a:t>27</a:t>
             </a:fld>
             <a:endParaRPr lang="en-US"/>
           </a:p>
@@ -968,7 +959,7 @@
           <a:ln/>
           <a:extLst>
             <a:ext uri="{AF507438-7753-43e0-B8FC-AC1667EBCBE1}">
-              <a14:hiddenEffects xmlns="" xmlns:a14="http://schemas.microsoft.com/office/drawing/2010/main">
+              <a14:hiddenEffects xmlns:a14="http://schemas.microsoft.com/office/drawing/2010/main" xmlns="">
                 <a:effectLst>
                   <a:outerShdw blurRad="63500" dist="38099" dir="2700000" algn="ctr" rotWithShape="0">
                     <a:srgbClr val="000000">
@@ -999,7 +990,7 @@
           <a:ln/>
           <a:extLst>
             <a:ext uri="{AF507438-7753-43e0-B8FC-AC1667EBCBE1}">
-              <a14:hiddenEffects xmlns="" xmlns:a14="http://schemas.microsoft.com/office/drawing/2010/main">
+              <a14:hiddenEffects xmlns:a14="http://schemas.microsoft.com/office/drawing/2010/main" xmlns="">
                 <a:effectLst>
                   <a:outerShdw blurRad="63500" dist="38099" dir="2700000" algn="ctr" rotWithShape="0">
                     <a:srgbClr val="000000">
@@ -1085,7 +1076,7 @@
               <a:pPr>
                 <a:defRPr/>
               </a:pPr>
-              <a:t>29</a:t>
+              <a:t>28</a:t>
             </a:fld>
             <a:endParaRPr lang="en-US"/>
           </a:p>
@@ -1112,7 +1103,7 @@
           <a:ln/>
           <a:extLst>
             <a:ext uri="{AF507438-7753-43e0-B8FC-AC1667EBCBE1}">
-              <a14:hiddenEffects xmlns="" xmlns:a14="http://schemas.microsoft.com/office/drawing/2010/main">
+              <a14:hiddenEffects xmlns:a14="http://schemas.microsoft.com/office/drawing/2010/main" xmlns="">
                 <a:effectLst>
                   <a:outerShdw blurRad="63500" dist="38099" dir="2700000" algn="ctr" rotWithShape="0">
                     <a:srgbClr val="000000">
@@ -1143,7 +1134,7 @@
           <a:ln/>
           <a:extLst>
             <a:ext uri="{AF507438-7753-43e0-B8FC-AC1667EBCBE1}">
-              <a14:hiddenEffects xmlns="" xmlns:a14="http://schemas.microsoft.com/office/drawing/2010/main">
+              <a14:hiddenEffects xmlns:a14="http://schemas.microsoft.com/office/drawing/2010/main" xmlns="">
                 <a:effectLst>
                   <a:outerShdw blurRad="63500" dist="38099" dir="2700000" algn="ctr" rotWithShape="0">
                     <a:srgbClr val="000000">
@@ -1229,7 +1220,7 @@
               <a:pPr>
                 <a:defRPr/>
               </a:pPr>
-              <a:t>18</a:t>
+              <a:t>17</a:t>
             </a:fld>
             <a:endParaRPr lang="en-US"/>
           </a:p>
@@ -1256,7 +1247,7 @@
           <a:ln/>
           <a:extLst>
             <a:ext uri="{AF507438-7753-43e0-B8FC-AC1667EBCBE1}">
-              <a14:hiddenEffects xmlns="" xmlns:a14="http://schemas.microsoft.com/office/drawing/2010/main">
+              <a14:hiddenEffects xmlns:a14="http://schemas.microsoft.com/office/drawing/2010/main" xmlns="">
                 <a:effectLst>
                   <a:outerShdw blurRad="63500" dist="38099" dir="2700000" algn="ctr" rotWithShape="0">
                     <a:srgbClr val="000000">
@@ -1287,7 +1278,7 @@
           <a:ln/>
           <a:extLst>
             <a:ext uri="{AF507438-7753-43e0-B8FC-AC1667EBCBE1}">
-              <a14:hiddenEffects xmlns="" xmlns:a14="http://schemas.microsoft.com/office/drawing/2010/main">
+              <a14:hiddenEffects xmlns:a14="http://schemas.microsoft.com/office/drawing/2010/main" xmlns="">
                 <a:effectLst>
                   <a:outerShdw blurRad="63500" dist="38099" dir="2700000" algn="ctr" rotWithShape="0">
                     <a:srgbClr val="000000">
@@ -1373,7 +1364,7 @@
               <a:pPr>
                 <a:defRPr/>
               </a:pPr>
-              <a:t>19</a:t>
+              <a:t>18</a:t>
             </a:fld>
             <a:endParaRPr lang="en-US"/>
           </a:p>
@@ -1400,7 +1391,7 @@
           <a:ln/>
           <a:extLst>
             <a:ext uri="{AF507438-7753-43e0-B8FC-AC1667EBCBE1}">
-              <a14:hiddenEffects xmlns="" xmlns:a14="http://schemas.microsoft.com/office/drawing/2010/main">
+              <a14:hiddenEffects xmlns:a14="http://schemas.microsoft.com/office/drawing/2010/main" xmlns="">
                 <a:effectLst>
                   <a:outerShdw blurRad="63500" dist="38099" dir="2700000" algn="ctr" rotWithShape="0">
                     <a:srgbClr val="000000">
@@ -1431,7 +1422,7 @@
           <a:ln/>
           <a:extLst>
             <a:ext uri="{AF507438-7753-43e0-B8FC-AC1667EBCBE1}">
-              <a14:hiddenEffects xmlns="" xmlns:a14="http://schemas.microsoft.com/office/drawing/2010/main">
+              <a14:hiddenEffects xmlns:a14="http://schemas.microsoft.com/office/drawing/2010/main" xmlns="">
                 <a:effectLst>
                   <a:outerShdw blurRad="63500" dist="38099" dir="2700000" algn="ctr" rotWithShape="0">
                     <a:srgbClr val="000000">
@@ -1517,7 +1508,7 @@
               <a:pPr>
                 <a:defRPr/>
               </a:pPr>
-              <a:t>20</a:t>
+              <a:t>19</a:t>
             </a:fld>
             <a:endParaRPr lang="en-US"/>
           </a:p>
@@ -1544,7 +1535,7 @@
           <a:ln/>
           <a:extLst>
             <a:ext uri="{AF507438-7753-43e0-B8FC-AC1667EBCBE1}">
-              <a14:hiddenEffects xmlns="" xmlns:a14="http://schemas.microsoft.com/office/drawing/2010/main">
+              <a14:hiddenEffects xmlns:a14="http://schemas.microsoft.com/office/drawing/2010/main" xmlns="">
                 <a:effectLst>
                   <a:outerShdw blurRad="63500" dist="38099" dir="2700000" algn="ctr" rotWithShape="0">
                     <a:srgbClr val="000000">
@@ -1575,7 +1566,7 @@
           <a:ln/>
           <a:extLst>
             <a:ext uri="{AF507438-7753-43e0-B8FC-AC1667EBCBE1}">
-              <a14:hiddenEffects xmlns="" xmlns:a14="http://schemas.microsoft.com/office/drawing/2010/main">
+              <a14:hiddenEffects xmlns:a14="http://schemas.microsoft.com/office/drawing/2010/main" xmlns="">
                 <a:effectLst>
                   <a:outerShdw blurRad="63500" dist="38099" dir="2700000" algn="ctr" rotWithShape="0">
                     <a:srgbClr val="000000">
@@ -1661,7 +1652,7 @@
               <a:pPr>
                 <a:defRPr/>
               </a:pPr>
-              <a:t>21</a:t>
+              <a:t>20</a:t>
             </a:fld>
             <a:endParaRPr lang="en-US"/>
           </a:p>
@@ -1688,7 +1679,7 @@
           <a:ln/>
           <a:extLst>
             <a:ext uri="{AF507438-7753-43e0-B8FC-AC1667EBCBE1}">
-              <a14:hiddenEffects xmlns="" xmlns:a14="http://schemas.microsoft.com/office/drawing/2010/main">
+              <a14:hiddenEffects xmlns:a14="http://schemas.microsoft.com/office/drawing/2010/main" xmlns="">
                 <a:effectLst>
                   <a:outerShdw blurRad="63500" dist="38099" dir="2700000" algn="ctr" rotWithShape="0">
                     <a:srgbClr val="000000">
@@ -1719,7 +1710,7 @@
           <a:ln/>
           <a:extLst>
             <a:ext uri="{AF507438-7753-43e0-B8FC-AC1667EBCBE1}">
-              <a14:hiddenEffects xmlns="" xmlns:a14="http://schemas.microsoft.com/office/drawing/2010/main">
+              <a14:hiddenEffects xmlns:a14="http://schemas.microsoft.com/office/drawing/2010/main" xmlns="">
                 <a:effectLst>
                   <a:outerShdw blurRad="63500" dist="38099" dir="2700000" algn="ctr" rotWithShape="0">
                     <a:srgbClr val="000000">
@@ -1805,7 +1796,7 @@
               <a:pPr>
                 <a:defRPr/>
               </a:pPr>
-              <a:t>22</a:t>
+              <a:t>21</a:t>
             </a:fld>
             <a:endParaRPr lang="en-US"/>
           </a:p>
@@ -1832,7 +1823,7 @@
           <a:ln/>
           <a:extLst>
             <a:ext uri="{AF507438-7753-43e0-B8FC-AC1667EBCBE1}">
-              <a14:hiddenEffects xmlns="" xmlns:a14="http://schemas.microsoft.com/office/drawing/2010/main">
+              <a14:hiddenEffects xmlns:a14="http://schemas.microsoft.com/office/drawing/2010/main" xmlns="">
                 <a:effectLst>
                   <a:outerShdw blurRad="63500" dist="38099" dir="2700000" algn="ctr" rotWithShape="0">
                     <a:srgbClr val="000000">
@@ -1863,7 +1854,7 @@
           <a:ln/>
           <a:extLst>
             <a:ext uri="{AF507438-7753-43e0-B8FC-AC1667EBCBE1}">
-              <a14:hiddenEffects xmlns="" xmlns:a14="http://schemas.microsoft.com/office/drawing/2010/main">
+              <a14:hiddenEffects xmlns:a14="http://schemas.microsoft.com/office/drawing/2010/main" xmlns="">
                 <a:effectLst>
                   <a:outerShdw blurRad="63500" dist="38099" dir="2700000" algn="ctr" rotWithShape="0">
                     <a:srgbClr val="000000">
@@ -1949,7 +1940,7 @@
               <a:pPr>
                 <a:defRPr/>
               </a:pPr>
-              <a:t>23</a:t>
+              <a:t>22</a:t>
             </a:fld>
             <a:endParaRPr lang="en-US"/>
           </a:p>
@@ -1976,7 +1967,7 @@
           <a:ln/>
           <a:extLst>
             <a:ext uri="{AF507438-7753-43e0-B8FC-AC1667EBCBE1}">
-              <a14:hiddenEffects xmlns="" xmlns:a14="http://schemas.microsoft.com/office/drawing/2010/main">
+              <a14:hiddenEffects xmlns:a14="http://schemas.microsoft.com/office/drawing/2010/main" xmlns="">
                 <a:effectLst>
                   <a:outerShdw blurRad="63500" dist="38099" dir="2700000" algn="ctr" rotWithShape="0">
                     <a:srgbClr val="000000">
@@ -2007,7 +1998,7 @@
           <a:ln/>
           <a:extLst>
             <a:ext uri="{AF507438-7753-43e0-B8FC-AC1667EBCBE1}">
-              <a14:hiddenEffects xmlns="" xmlns:a14="http://schemas.microsoft.com/office/drawing/2010/main">
+              <a14:hiddenEffects xmlns:a14="http://schemas.microsoft.com/office/drawing/2010/main" xmlns="">
                 <a:effectLst>
                   <a:outerShdw blurRad="63500" dist="38099" dir="2700000" algn="ctr" rotWithShape="0">
                     <a:srgbClr val="000000">
@@ -2093,7 +2084,7 @@
               <a:pPr>
                 <a:defRPr/>
               </a:pPr>
-              <a:t>24</a:t>
+              <a:t>23</a:t>
             </a:fld>
             <a:endParaRPr lang="en-US"/>
           </a:p>
@@ -2120,7 +2111,7 @@
           <a:ln/>
           <a:extLst>
             <a:ext uri="{AF507438-7753-43e0-B8FC-AC1667EBCBE1}">
-              <a14:hiddenEffects xmlns="" xmlns:a14="http://schemas.microsoft.com/office/drawing/2010/main">
+              <a14:hiddenEffects xmlns:a14="http://schemas.microsoft.com/office/drawing/2010/main" xmlns="">
                 <a:effectLst>
                   <a:outerShdw blurRad="63500" dist="38099" dir="2700000" algn="ctr" rotWithShape="0">
                     <a:srgbClr val="000000">
@@ -2151,7 +2142,7 @@
           <a:ln/>
           <a:extLst>
             <a:ext uri="{AF507438-7753-43e0-B8FC-AC1667EBCBE1}">
-              <a14:hiddenEffects xmlns="" xmlns:a14="http://schemas.microsoft.com/office/drawing/2010/main">
+              <a14:hiddenEffects xmlns:a14="http://schemas.microsoft.com/office/drawing/2010/main" xmlns="">
                 <a:effectLst>
                   <a:outerShdw blurRad="63500" dist="38099" dir="2700000" algn="ctr" rotWithShape="0">
                     <a:srgbClr val="000000">
@@ -2237,7 +2228,7 @@
               <a:pPr>
                 <a:defRPr/>
               </a:pPr>
-              <a:t>25</a:t>
+              <a:t>24</a:t>
             </a:fld>
             <a:endParaRPr lang="en-US"/>
           </a:p>
@@ -2264,7 +2255,7 @@
           <a:ln/>
           <a:extLst>
             <a:ext uri="{AF507438-7753-43e0-B8FC-AC1667EBCBE1}">
-              <a14:hiddenEffects xmlns="" xmlns:a14="http://schemas.microsoft.com/office/drawing/2010/main">
+              <a14:hiddenEffects xmlns:a14="http://schemas.microsoft.com/office/drawing/2010/main" xmlns="">
                 <a:effectLst>
                   <a:outerShdw blurRad="63500" dist="38099" dir="2700000" algn="ctr" rotWithShape="0">
                     <a:srgbClr val="000000">
@@ -2295,7 +2286,7 @@
           <a:ln/>
           <a:extLst>
             <a:ext uri="{AF507438-7753-43e0-B8FC-AC1667EBCBE1}">
-              <a14:hiddenEffects xmlns="" xmlns:a14="http://schemas.microsoft.com/office/drawing/2010/main">
+              <a14:hiddenEffects xmlns:a14="http://schemas.microsoft.com/office/drawing/2010/main" xmlns="">
                 <a:effectLst>
                   <a:outerShdw blurRad="63500" dist="38099" dir="2700000" algn="ctr" rotWithShape="0">
                     <a:srgbClr val="000000">
@@ -2520,7 +2511,7 @@
           <a:p>
             <a:fld id="{2691D6E4-0F7A-0249-86EF-226720E50E4C}" type="datetimeFigureOut">
               <a:rPr lang="en-US" smtClean="0"/>
-              <a:t>1/12/21</a:t>
+              <a:t>1/11/2022</a:t>
             </a:fld>
             <a:endParaRPr lang="en-US"/>
           </a:p>
@@ -2712,7 +2703,7 @@
           <a:p>
             <a:fld id="{2691D6E4-0F7A-0249-86EF-226720E50E4C}" type="datetimeFigureOut">
               <a:rPr lang="en-US" smtClean="0"/>
-              <a:t>1/12/21</a:t>
+              <a:t>1/11/2022</a:t>
             </a:fld>
             <a:endParaRPr lang="en-US"/>
           </a:p>
@@ -2914,7 +2905,7 @@
           <a:p>
             <a:fld id="{2691D6E4-0F7A-0249-86EF-226720E50E4C}" type="datetimeFigureOut">
               <a:rPr lang="en-US" smtClean="0"/>
-              <a:t>1/12/21</a:t>
+              <a:t>1/11/2022</a:t>
             </a:fld>
             <a:endParaRPr lang="en-US"/>
           </a:p>
@@ -3106,7 +3097,7 @@
           <a:p>
             <a:fld id="{2691D6E4-0F7A-0249-86EF-226720E50E4C}" type="datetimeFigureOut">
               <a:rPr lang="en-US" smtClean="0"/>
-              <a:t>1/12/21</a:t>
+              <a:t>1/11/2022</a:t>
             </a:fld>
             <a:endParaRPr lang="en-US"/>
           </a:p>
@@ -3375,7 +3366,7 @@
           <a:p>
             <a:fld id="{2691D6E4-0F7A-0249-86EF-226720E50E4C}" type="datetimeFigureOut">
               <a:rPr lang="en-US" smtClean="0"/>
-              <a:t>1/12/21</a:t>
+              <a:t>1/11/2022</a:t>
             </a:fld>
             <a:endParaRPr lang="en-US"/>
           </a:p>
@@ -3684,7 +3675,7 @@
           <a:p>
             <a:fld id="{2691D6E4-0F7A-0249-86EF-226720E50E4C}" type="datetimeFigureOut">
               <a:rPr lang="en-US" smtClean="0"/>
-              <a:t>1/12/21</a:t>
+              <a:t>1/11/2022</a:t>
             </a:fld>
             <a:endParaRPr lang="en-US"/>
           </a:p>
@@ -4127,7 +4118,7 @@
           <a:p>
             <a:fld id="{2691D6E4-0F7A-0249-86EF-226720E50E4C}" type="datetimeFigureOut">
               <a:rPr lang="en-US" smtClean="0"/>
-              <a:t>1/12/21</a:t>
+              <a:t>1/11/2022</a:t>
             </a:fld>
             <a:endParaRPr lang="en-US"/>
           </a:p>
@@ -4268,7 +4259,7 @@
           <a:p>
             <a:fld id="{2691D6E4-0F7A-0249-86EF-226720E50E4C}" type="datetimeFigureOut">
               <a:rPr lang="en-US" smtClean="0"/>
-              <a:t>1/12/21</a:t>
+              <a:t>1/11/2022</a:t>
             </a:fld>
             <a:endParaRPr lang="en-US"/>
           </a:p>
@@ -4387,7 +4378,7 @@
           <a:p>
             <a:fld id="{2691D6E4-0F7A-0249-86EF-226720E50E4C}" type="datetimeFigureOut">
               <a:rPr lang="en-US" smtClean="0"/>
-              <a:t>1/12/21</a:t>
+              <a:t>1/11/2022</a:t>
             </a:fld>
             <a:endParaRPr lang="en-US"/>
           </a:p>
@@ -4686,7 +4677,7 @@
           <a:p>
             <a:fld id="{2691D6E4-0F7A-0249-86EF-226720E50E4C}" type="datetimeFigureOut">
               <a:rPr lang="en-US" smtClean="0"/>
-              <a:t>1/12/21</a:t>
+              <a:t>1/11/2022</a:t>
             </a:fld>
             <a:endParaRPr lang="en-US"/>
           </a:p>
@@ -4962,7 +4953,7 @@
           <a:p>
             <a:fld id="{2691D6E4-0F7A-0249-86EF-226720E50E4C}" type="datetimeFigureOut">
               <a:rPr lang="en-US" smtClean="0"/>
-              <a:t>1/12/21</a:t>
+              <a:t>1/11/2022</a:t>
             </a:fld>
             <a:endParaRPr lang="en-US"/>
           </a:p>
@@ -6094,7 +6085,7 @@
               <a:rPr lang="en-US" dirty="0">
                 <a:latin typeface="Calibri" charset="0"/>
               </a:rPr>
-              <a:t>You have a working piece of software</a:t>
+              <a:t>You are developing software with other people</a:t>
             </a:r>
           </a:p>
           <a:p>
@@ -6110,7 +6101,23 @@
               <a:rPr lang="en-US" sz="3200" dirty="0">
                 <a:latin typeface="Calibri" charset="0"/>
               </a:rPr>
-              <a:t>You add some new features</a:t>
+              <a:t>You want to be able to identify and resolve conflicts during code development</a:t>
+            </a:r>
+          </a:p>
+          <a:p>
+            <a:pPr lvl="2">
+              <a:spcBef>
+                <a:spcPts val="800"/>
+              </a:spcBef>
+              <a:buFont typeface="Arial" charset="0"/>
+              <a:buChar char="•"/>
+              <a:defRPr/>
+            </a:pPr>
+            <a:r>
+              <a:rPr lang="en-US" sz="3200" dirty="0">
+                <a:latin typeface="Calibri" charset="0"/>
+              </a:rPr>
+              <a:t>Two people working on the same function at the same time</a:t>
             </a:r>
           </a:p>
           <a:p>
@@ -6126,11 +6133,11 @@
               <a:rPr lang="en-US" sz="3200" dirty="0">
                 <a:latin typeface="Calibri" charset="0"/>
               </a:rPr>
-              <a:t>Everything is broken</a:t>
-            </a:r>
-          </a:p>
-          <a:p>
-            <a:pPr lvl="1">
+              <a:t>You need to be able to identify who is responsible for what pieces of code</a:t>
+            </a:r>
+          </a:p>
+          <a:p>
+            <a:pPr lvl="2">
               <a:spcBef>
                 <a:spcPts val="800"/>
               </a:spcBef>
@@ -6138,169 +6145,25 @@
               <a:buChar char="•"/>
               <a:defRPr/>
             </a:pPr>
-            <a:r>
-              <a:rPr lang="en-US" sz="3200" dirty="0">
-                <a:latin typeface="Calibri" charset="0"/>
-              </a:rPr>
-              <a:t>You want to revert to the last known working version</a:t>
-            </a:r>
+            <a:endParaRPr lang="en-US" sz="3200" dirty="0">
+              <a:latin typeface="Calibri" charset="0"/>
+            </a:endParaRPr>
           </a:p>
           <a:p>
             <a:endParaRPr lang="en-US" dirty="0"/>
           </a:p>
         </p:txBody>
       </p:sp>
-      <p:pic>
-        <p:nvPicPr>
-          <p:cNvPr id="4" name="Picture 3"/>
-          <p:cNvPicPr>
-            <a:picLocks noChangeAspect="1"/>
-          </p:cNvPicPr>
-          <p:nvPr/>
-        </p:nvPicPr>
-        <p:blipFill>
-          <a:blip r:embed="rId2"/>
-          <a:stretch>
-            <a:fillRect/>
-          </a:stretch>
-        </p:blipFill>
-        <p:spPr>
-          <a:xfrm>
-            <a:off x="1828800" y="4503010"/>
-            <a:ext cx="5257800" cy="1870651"/>
-          </a:xfrm>
-          <a:prstGeom prst="rect">
-            <a:avLst/>
-          </a:prstGeom>
-        </p:spPr>
-      </p:pic>
-      <p:cxnSp>
-        <p:nvCxnSpPr>
-          <p:cNvPr id="5" name="Straight Arrow Connector 4"/>
-          <p:cNvCxnSpPr/>
-          <p:nvPr/>
-        </p:nvCxnSpPr>
-        <p:spPr bwMode="auto">
-          <a:xfrm flipH="1">
-            <a:off x="5029200" y="5188810"/>
-            <a:ext cx="1447800" cy="0"/>
-          </a:xfrm>
-          <a:prstGeom prst="straightConnector1">
-            <a:avLst/>
-          </a:prstGeom>
-          <a:solidFill>
-            <a:srgbClr val="00B8FF"/>
-          </a:solidFill>
-          <a:ln w="76200" cap="flat" cmpd="sng" algn="ctr">
-            <a:solidFill>
-              <a:srgbClr val="FF0000"/>
-            </a:solidFill>
-            <a:prstDash val="solid"/>
-            <a:round/>
-            <a:headEnd type="none" w="med" len="med"/>
-            <a:tailEnd type="arrow"/>
-          </a:ln>
-          <a:effectLst/>
-          <a:extLst>
-            <a:ext uri="{AF507438-7753-43e0-B8FC-AC1667EBCBE1}">
-              <a14:hiddenEffects xmlns="" xmlns:a14="http://schemas.microsoft.com/office/drawing/2010/main">
-                <a:effectLst>
-                  <a:outerShdw blurRad="63500" dist="38099" dir="2700000" algn="ctr" rotWithShape="0">
-                    <a:schemeClr val="bg2">
-                      <a:alpha val="74998"/>
-                    </a:schemeClr>
-                  </a:outerShdw>
-                </a:effectLst>
-              </a14:hiddenEffects>
-            </a:ext>
-          </a:extLst>
-        </p:spPr>
-      </p:cxnSp>
     </p:spTree>
     <p:extLst>
       <p:ext uri="{BB962C8B-B14F-4D97-AF65-F5344CB8AC3E}">
-        <p14:creationId xmlns:p14="http://schemas.microsoft.com/office/powerpoint/2010/main" val="1241212164"/>
+        <p14:creationId xmlns:p14="http://schemas.microsoft.com/office/powerpoint/2010/main" val="99088052"/>
       </p:ext>
     </p:extLst>
   </p:cSld>
   <p:clrMapOvr>
     <a:masterClrMapping/>
   </p:clrMapOvr>
-  <p:timing>
-    <p:tnLst>
-      <p:par>
-        <p:cTn id="1" dur="indefinite" restart="never" nodeType="tmRoot">
-          <p:childTnLst>
-            <p:seq concurrent="1" nextAc="seek">
-              <p:cTn id="2" dur="indefinite" nodeType="mainSeq">
-                <p:childTnLst>
-                  <p:par>
-                    <p:cTn id="3" fill="hold">
-                      <p:stCondLst>
-                        <p:cond delay="indefinite"/>
-                      </p:stCondLst>
-                      <p:childTnLst>
-                        <p:par>
-                          <p:cTn id="4" fill="hold">
-                            <p:stCondLst>
-                              <p:cond delay="0"/>
-                            </p:stCondLst>
-                            <p:childTnLst>
-                              <p:par>
-                                <p:cTn id="5" presetID="1" presetClass="entr" presetSubtype="0" fill="hold" nodeType="clickEffect">
-                                  <p:stCondLst>
-                                    <p:cond delay="0"/>
-                                  </p:stCondLst>
-                                  <p:childTnLst>
-                                    <p:set>
-                                      <p:cBhvr>
-                                        <p:cTn id="6" dur="1" fill="hold">
-                                          <p:stCondLst>
-                                            <p:cond delay="0"/>
-                                          </p:stCondLst>
-                                        </p:cTn>
-                                        <p:tgtEl>
-                                          <p:spTgt spid="4"/>
-                                        </p:tgtEl>
-                                        <p:attrNameLst>
-                                          <p:attrName>style.visibility</p:attrName>
-                                        </p:attrNameLst>
-                                      </p:cBhvr>
-                                      <p:to>
-                                        <p:strVal val="visible"/>
-                                      </p:to>
-                                    </p:set>
-                                  </p:childTnLst>
-                                </p:cTn>
-                              </p:par>
-                            </p:childTnLst>
-                          </p:cTn>
-                        </p:par>
-                      </p:childTnLst>
-                    </p:cTn>
-                  </p:par>
-                </p:childTnLst>
-              </p:cTn>
-              <p:prevCondLst>
-                <p:cond evt="onPrev" delay="0">
-                  <p:tgtEl>
-                    <p:sldTgt/>
-                  </p:tgtEl>
-                </p:cond>
-              </p:prevCondLst>
-              <p:nextCondLst>
-                <p:cond evt="onNext" delay="0">
-                  <p:tgtEl>
-                    <p:sldTgt/>
-                  </p:tgtEl>
-                </p:cond>
-              </p:nextCondLst>
-            </p:seq>
-          </p:childTnLst>
-        </p:cTn>
-      </p:par>
-    </p:tnLst>
-  </p:timing>
 </p:sld>
 </file>
 
@@ -6358,91 +6221,38 @@
           <a:bodyPr/>
           <a:lstStyle/>
           <a:p>
-            <a:pPr>
-              <a:spcBef>
-                <a:spcPts val="800"/>
-              </a:spcBef>
-              <a:buFont typeface="Arial" charset="0"/>
-              <a:buChar char="•"/>
-              <a:defRPr/>
-            </a:pPr>
-            <a:r>
-              <a:rPr lang="en-US" dirty="0">
-                <a:latin typeface="Calibri" charset="0"/>
-              </a:rPr>
-              <a:t>You are developing software with other people</a:t>
-            </a:r>
-          </a:p>
-          <a:p>
-            <a:pPr lvl="1">
-              <a:spcBef>
-                <a:spcPts val="800"/>
-              </a:spcBef>
-              <a:buFont typeface="Arial" charset="0"/>
-              <a:buChar char="•"/>
-              <a:defRPr/>
-            </a:pPr>
-            <a:r>
-              <a:rPr lang="en-US" sz="3200" dirty="0">
-                <a:latin typeface="Calibri" charset="0"/>
-              </a:rPr>
-              <a:t>You want to be able to identify and resolve conflicts during code development</a:t>
-            </a:r>
-          </a:p>
-          <a:p>
-            <a:pPr lvl="2">
-              <a:spcBef>
-                <a:spcPts val="800"/>
-              </a:spcBef>
-              <a:buFont typeface="Arial" charset="0"/>
-              <a:buChar char="•"/>
-              <a:defRPr/>
-            </a:pPr>
-            <a:r>
-              <a:rPr lang="en-US" sz="3200" dirty="0">
-                <a:latin typeface="Calibri" charset="0"/>
-              </a:rPr>
-              <a:t>Two people working on the same function at the same time</a:t>
-            </a:r>
-          </a:p>
-          <a:p>
-            <a:pPr lvl="1">
-              <a:spcBef>
-                <a:spcPts val="800"/>
-              </a:spcBef>
-              <a:buFont typeface="Arial" charset="0"/>
-              <a:buChar char="•"/>
-              <a:defRPr/>
-            </a:pPr>
-            <a:r>
-              <a:rPr lang="en-US" sz="3200" dirty="0">
-                <a:latin typeface="Calibri" charset="0"/>
-              </a:rPr>
-              <a:t>You need to be able to identify who is responsible for what pieces of code</a:t>
-            </a:r>
-          </a:p>
-          <a:p>
-            <a:pPr lvl="2">
-              <a:spcBef>
-                <a:spcPts val="800"/>
-              </a:spcBef>
-              <a:buFont typeface="Arial" charset="0"/>
-              <a:buChar char="•"/>
-              <a:defRPr/>
-            </a:pPr>
-            <a:endParaRPr lang="en-US" sz="3200" dirty="0">
-              <a:latin typeface="Calibri" charset="0"/>
-            </a:endParaRPr>
-          </a:p>
-          <a:p>
-            <a:endParaRPr lang="en-US" dirty="0"/>
-          </a:p>
-        </p:txBody>
-      </p:sp>
+            <a:endParaRPr lang="en-US"/>
+          </a:p>
+        </p:txBody>
+      </p:sp>
+      <p:pic>
+        <p:nvPicPr>
+          <p:cNvPr id="4" name="Picture 3"/>
+          <p:cNvPicPr>
+            <a:picLocks noChangeAspect="1"/>
+          </p:cNvPicPr>
+          <p:nvPr/>
+        </p:nvPicPr>
+        <p:blipFill>
+          <a:blip r:embed="rId2"/>
+          <a:stretch>
+            <a:fillRect/>
+          </a:stretch>
+        </p:blipFill>
+        <p:spPr>
+          <a:xfrm>
+            <a:off x="2254250" y="1747536"/>
+            <a:ext cx="4635500" cy="4762500"/>
+          </a:xfrm>
+          <a:prstGeom prst="rect">
+            <a:avLst/>
+          </a:prstGeom>
+        </p:spPr>
+      </p:pic>
     </p:spTree>
     <p:extLst>
       <p:ext uri="{BB962C8B-B14F-4D97-AF65-F5344CB8AC3E}">
-        <p14:creationId xmlns:p14="http://schemas.microsoft.com/office/powerpoint/2010/main" val="99088052"/>
+        <p14:creationId xmlns:p14="http://schemas.microsoft.com/office/powerpoint/2010/main" val="261644260"/>
       </p:ext>
     </p:extLst>
   </p:cSld>
@@ -6526,18 +6336,84 @@
         </p:blipFill>
         <p:spPr>
           <a:xfrm>
-            <a:off x="2254250" y="1747536"/>
-            <a:ext cx="4635500" cy="4762500"/>
+            <a:off x="2133600" y="1717072"/>
+            <a:ext cx="4876800" cy="4940300"/>
           </a:xfrm>
           <a:prstGeom prst="rect">
             <a:avLst/>
           </a:prstGeom>
         </p:spPr>
       </p:pic>
+      <p:sp>
+        <p:nvSpPr>
+          <p:cNvPr id="5" name="TextBox 4"/>
+          <p:cNvSpPr txBox="1"/>
+          <p:nvPr/>
+        </p:nvSpPr>
+        <p:spPr>
+          <a:xfrm>
+            <a:off x="1219200" y="2364772"/>
+            <a:ext cx="868597" cy="461665"/>
+          </a:xfrm>
+          <a:prstGeom prst="rect">
+            <a:avLst/>
+          </a:prstGeom>
+          <a:noFill/>
+        </p:spPr>
+        <p:txBody>
+          <a:bodyPr wrap="none" rtlCol="0">
+            <a:spAutoFit/>
+          </a:bodyPr>
+          <a:lstStyle/>
+          <a:p>
+            <a:r>
+              <a:rPr lang="en-US" dirty="0">
+                <a:solidFill>
+                  <a:schemeClr val="tx1"/>
+                </a:solidFill>
+              </a:rPr>
+              <a:t>Mary</a:t>
+            </a:r>
+          </a:p>
+        </p:txBody>
+      </p:sp>
+      <p:sp>
+        <p:nvSpPr>
+          <p:cNvPr id="6" name="TextBox 5"/>
+          <p:cNvSpPr txBox="1"/>
+          <p:nvPr/>
+        </p:nvSpPr>
+        <p:spPr>
+          <a:xfrm>
+            <a:off x="1219200" y="4650772"/>
+            <a:ext cx="864590" cy="461665"/>
+          </a:xfrm>
+          <a:prstGeom prst="rect">
+            <a:avLst/>
+          </a:prstGeom>
+          <a:noFill/>
+        </p:spPr>
+        <p:txBody>
+          <a:bodyPr wrap="none" rtlCol="0">
+            <a:spAutoFit/>
+          </a:bodyPr>
+          <a:lstStyle/>
+          <a:p>
+            <a:r>
+              <a:rPr lang="en-US" dirty="0">
+                <a:solidFill>
+                  <a:schemeClr val="tx1"/>
+                </a:solidFill>
+              </a:rPr>
+              <a:t>Alice</a:t>
+            </a:r>
+          </a:p>
+        </p:txBody>
+      </p:sp>
     </p:spTree>
     <p:extLst>
       <p:ext uri="{BB962C8B-B14F-4D97-AF65-F5344CB8AC3E}">
-        <p14:creationId xmlns:p14="http://schemas.microsoft.com/office/powerpoint/2010/main" val="261644260"/>
+        <p14:creationId xmlns:p14="http://schemas.microsoft.com/office/powerpoint/2010/main" val="594885862"/>
       </p:ext>
     </p:extLst>
   </p:cSld>
@@ -6581,7 +6457,7 @@
           <a:p>
             <a:r>
               <a:rPr lang="en-US" dirty="0"/>
-              <a:t>Why do I need version control?</a:t>
+              <a:t>Why else?</a:t>
             </a:r>
           </a:p>
         </p:txBody>
@@ -6601,104 +6477,46 @@
           <a:bodyPr/>
           <a:lstStyle/>
           <a:p>
-            <a:endParaRPr lang="en-US"/>
-          </a:p>
-        </p:txBody>
-      </p:sp>
-      <p:pic>
-        <p:nvPicPr>
-          <p:cNvPr id="4" name="Picture 3"/>
-          <p:cNvPicPr>
-            <a:picLocks noChangeAspect="1"/>
-          </p:cNvPicPr>
-          <p:nvPr/>
-        </p:nvPicPr>
-        <p:blipFill>
-          <a:blip r:embed="rId2"/>
-          <a:stretch>
-            <a:fillRect/>
-          </a:stretch>
-        </p:blipFill>
-        <p:spPr>
-          <a:xfrm>
-            <a:off x="2133600" y="1717072"/>
-            <a:ext cx="4876800" cy="4940300"/>
-          </a:xfrm>
-          <a:prstGeom prst="rect">
-            <a:avLst/>
-          </a:prstGeom>
-        </p:spPr>
-      </p:pic>
-      <p:sp>
-        <p:nvSpPr>
-          <p:cNvPr id="5" name="TextBox 4"/>
-          <p:cNvSpPr txBox="1"/>
-          <p:nvPr/>
-        </p:nvSpPr>
-        <p:spPr>
-          <a:xfrm>
-            <a:off x="1219200" y="2364772"/>
-            <a:ext cx="868597" cy="461665"/>
-          </a:xfrm>
-          <a:prstGeom prst="rect">
-            <a:avLst/>
-          </a:prstGeom>
-          <a:noFill/>
-        </p:spPr>
-        <p:txBody>
-          <a:bodyPr wrap="none" rtlCol="0">
-            <a:spAutoFit/>
-          </a:bodyPr>
-          <a:lstStyle/>
-          <a:p>
+            <a:pPr>
+              <a:spcBef>
+                <a:spcPts val="800"/>
+              </a:spcBef>
+              <a:buFont typeface="Arial" charset="0"/>
+              <a:buChar char="•"/>
+              <a:defRPr/>
+            </a:pPr>
             <a:r>
               <a:rPr lang="en-US" dirty="0">
-                <a:solidFill>
-                  <a:schemeClr val="tx1"/>
-                </a:solidFill>
+                <a:latin typeface="Calibri" charset="0"/>
               </a:rPr>
-              <a:t>Mary</a:t>
-            </a:r>
-          </a:p>
-        </p:txBody>
-      </p:sp>
-      <p:sp>
-        <p:nvSpPr>
-          <p:cNvPr id="6" name="TextBox 5"/>
-          <p:cNvSpPr txBox="1"/>
-          <p:nvPr/>
-        </p:nvSpPr>
-        <p:spPr>
-          <a:xfrm>
-            <a:off x="1219200" y="4650772"/>
-            <a:ext cx="864590" cy="461665"/>
-          </a:xfrm>
-          <a:prstGeom prst="rect">
-            <a:avLst/>
-          </a:prstGeom>
-          <a:noFill/>
-        </p:spPr>
-        <p:txBody>
-          <a:bodyPr wrap="none" rtlCol="0">
-            <a:spAutoFit/>
-          </a:bodyPr>
-          <a:lstStyle/>
-          <a:p>
-            <a:r>
-              <a:rPr lang="en-US" dirty="0">
-                <a:solidFill>
-                  <a:schemeClr val="tx1"/>
-                </a:solidFill>
+              <a:t>You want a job</a:t>
+            </a:r>
+          </a:p>
+          <a:p>
+            <a:pPr lvl="1">
+              <a:spcBef>
+                <a:spcPts val="800"/>
+              </a:spcBef>
+              <a:buFont typeface="Arial" charset="0"/>
+              <a:buChar char="•"/>
+              <a:defRPr/>
+            </a:pPr>
+            <a:r>
+              <a:rPr lang="en-US" sz="3200" dirty="0">
+                <a:latin typeface="Calibri" charset="0"/>
               </a:rPr>
-              <a:t>Alice</a:t>
-            </a:r>
+              <a:t>No one will hire a software developer that doesn’t know how to use version control</a:t>
+            </a:r>
+          </a:p>
+          <a:p>
+            <a:endParaRPr lang="en-US" dirty="0"/>
           </a:p>
         </p:txBody>
       </p:sp>
     </p:spTree>
     <p:extLst>
       <p:ext uri="{BB962C8B-B14F-4D97-AF65-F5344CB8AC3E}">
-        <p14:creationId xmlns:p14="http://schemas.microsoft.com/office/powerpoint/2010/main" val="594885862"/>
+        <p14:creationId xmlns:p14="http://schemas.microsoft.com/office/powerpoint/2010/main" val="591837602"/>
       </p:ext>
     </p:extLst>
   </p:cSld>
@@ -6742,7 +6560,15 @@
           <a:p>
             <a:r>
               <a:rPr lang="en-US" dirty="0"/>
-              <a:t>Why else?</a:t>
+              <a:t>What is </a:t>
+            </a:r>
+            <a:r>
+              <a:rPr lang="en-US" dirty="0" err="1"/>
+              <a:t>git</a:t>
+            </a:r>
+            <a:r>
+              <a:rPr lang="en-US" dirty="0"/>
+              <a:t>?</a:t>
             </a:r>
           </a:p>
         </p:txBody>
@@ -6771,10 +6597,60 @@
               <a:defRPr/>
             </a:pPr>
             <a:r>
+              <a:rPr lang="en-US" dirty="0" err="1">
+                <a:latin typeface="Calibri" charset="0"/>
+              </a:rPr>
+              <a:t>Git</a:t>
+            </a:r>
+            <a:r>
               <a:rPr lang="en-US" dirty="0">
                 <a:latin typeface="Calibri" charset="0"/>
               </a:rPr>
-              <a:t>You want a job</a:t>
+              <a:t> is the most popular version control software</a:t>
+            </a:r>
+          </a:p>
+          <a:p>
+            <a:pPr>
+              <a:spcBef>
+                <a:spcPts val="800"/>
+              </a:spcBef>
+              <a:buFont typeface="Arial" charset="0"/>
+              <a:buChar char="•"/>
+              <a:defRPr/>
+            </a:pPr>
+            <a:r>
+              <a:rPr lang="en-US" dirty="0" err="1">
+                <a:latin typeface="Calibri" charset="0"/>
+              </a:rPr>
+              <a:t>Git</a:t>
+            </a:r>
+            <a:r>
+              <a:rPr lang="en-US" dirty="0">
+                <a:latin typeface="Calibri" charset="0"/>
+              </a:rPr>
+              <a:t> is open source</a:t>
+            </a:r>
+          </a:p>
+          <a:p>
+            <a:pPr>
+              <a:spcBef>
+                <a:spcPts val="800"/>
+              </a:spcBef>
+              <a:buFont typeface="Arial" charset="0"/>
+              <a:buChar char="•"/>
+              <a:defRPr/>
+            </a:pPr>
+            <a:r>
+              <a:rPr lang="en-US" dirty="0" err="1">
+                <a:latin typeface="Calibri" charset="0"/>
+              </a:rPr>
+              <a:t>Git</a:t>
+            </a:r>
+            <a:r>
+              <a:rPr lang="en-US" dirty="0">
+                <a:latin typeface="Calibri" charset="0"/>
+              </a:rPr>
+              <a:t> runs on every platform</a:t>
             </a:r>
           </a:p>
           <a:p>
@@ -6790,8 +6666,43 @@
               <a:rPr lang="en-US" sz="3200" dirty="0">
                 <a:latin typeface="Calibri" charset="0"/>
               </a:rPr>
-              <a:t>No one will hire a software developer that doesn’t know how to use version control</a:t>
-            </a:r>
+              <a:t>even Plan 9 From Outer Space</a:t>
+            </a:r>
+          </a:p>
+          <a:p>
+            <a:pPr>
+              <a:spcBef>
+                <a:spcPts val="800"/>
+              </a:spcBef>
+              <a:buFont typeface="Arial" charset="0"/>
+              <a:buChar char="•"/>
+              <a:defRPr/>
+            </a:pPr>
+            <a:r>
+              <a:rPr lang="en-US" dirty="0" err="1">
+                <a:latin typeface="Calibri" charset="0"/>
+              </a:rPr>
+              <a:t>Git</a:t>
+            </a:r>
+            <a:r>
+              <a:rPr lang="en-US" dirty="0">
+                <a:latin typeface="Calibri" charset="0"/>
+              </a:rPr>
+              <a:t> is better than all previous version control tools (in my opinion, and I’ve used quite a few)</a:t>
+            </a:r>
+          </a:p>
+          <a:p>
+            <a:pPr>
+              <a:spcBef>
+                <a:spcPts val="800"/>
+              </a:spcBef>
+              <a:buFont typeface="Arial" charset="0"/>
+              <a:buChar char="•"/>
+              <a:defRPr/>
+            </a:pPr>
+            <a:endParaRPr lang="en-US" dirty="0">
+              <a:latin typeface="Calibri" charset="0"/>
+            </a:endParaRPr>
           </a:p>
           <a:p>
             <a:endParaRPr lang="en-US" dirty="0"/>
@@ -6801,7 +6712,7 @@
     </p:spTree>
     <p:extLst>
       <p:ext uri="{BB962C8B-B14F-4D97-AF65-F5344CB8AC3E}">
-        <p14:creationId xmlns:p14="http://schemas.microsoft.com/office/powerpoint/2010/main" val="591837602"/>
+        <p14:creationId xmlns:p14="http://schemas.microsoft.com/office/powerpoint/2010/main" val="503709198"/>
       </p:ext>
     </p:extLst>
   </p:cSld>
@@ -6845,15 +6756,7 @@
           <a:p>
             <a:r>
               <a:rPr lang="en-US" dirty="0"/>
-              <a:t>What is </a:t>
-            </a:r>
-            <a:r>
-              <a:rPr lang="en-US" dirty="0" err="1"/>
-              <a:t>git</a:t>
-            </a:r>
-            <a:r>
-              <a:rPr lang="en-US" dirty="0"/>
-              <a:t>?</a:t>
+              <a:t>What is GitHub?</a:t>
             </a:r>
           </a:p>
         </p:txBody>
@@ -6882,6 +6785,12 @@
               <a:defRPr/>
             </a:pPr>
             <a:r>
+              <a:rPr lang="en-US" dirty="0">
+                <a:latin typeface="Calibri" charset="0"/>
+              </a:rPr>
+              <a:t>‘</a:t>
+            </a:r>
+            <a:r>
               <a:rPr lang="en-US" dirty="0" err="1">
                 <a:latin typeface="Calibri" charset="0"/>
               </a:rPr>
@@ -6891,51 +6800,7 @@
               <a:rPr lang="en-US" dirty="0">
                 <a:latin typeface="Calibri" charset="0"/>
               </a:rPr>
-              <a:t> is the most popular version control software</a:t>
-            </a:r>
-          </a:p>
-          <a:p>
-            <a:pPr>
-              <a:spcBef>
-                <a:spcPts val="800"/>
-              </a:spcBef>
-              <a:buFont typeface="Arial" charset="0"/>
-              <a:buChar char="•"/>
-              <a:defRPr/>
-            </a:pPr>
-            <a:r>
-              <a:rPr lang="en-US" dirty="0" err="1">
-                <a:latin typeface="Calibri" charset="0"/>
-              </a:rPr>
-              <a:t>Git</a:t>
-            </a:r>
-            <a:r>
-              <a:rPr lang="en-US" dirty="0">
-                <a:latin typeface="Calibri" charset="0"/>
-              </a:rPr>
-              <a:t> is open source</a:t>
-            </a:r>
-          </a:p>
-          <a:p>
-            <a:pPr>
-              <a:spcBef>
-                <a:spcPts val="800"/>
-              </a:spcBef>
-              <a:buFont typeface="Arial" charset="0"/>
-              <a:buChar char="•"/>
-              <a:defRPr/>
-            </a:pPr>
-            <a:r>
-              <a:rPr lang="en-US" dirty="0" err="1">
-                <a:latin typeface="Calibri" charset="0"/>
-              </a:rPr>
-              <a:t>Git</a:t>
-            </a:r>
-            <a:r>
-              <a:rPr lang="en-US" dirty="0">
-                <a:latin typeface="Calibri" charset="0"/>
-              </a:rPr>
-              <a:t> runs on every platform</a:t>
+              <a:t> in the cloud’</a:t>
             </a:r>
           </a:p>
           <a:p>
@@ -6951,11 +6816,32 @@
               <a:rPr lang="en-US" sz="3200" dirty="0">
                 <a:latin typeface="Calibri" charset="0"/>
               </a:rPr>
-              <a:t>even Plan 9 From Outer Space</a:t>
-            </a:r>
-          </a:p>
-          <a:p>
-            <a:pPr>
+              <a:t>Your </a:t>
+            </a:r>
+            <a:r>
+              <a:rPr lang="en-US" sz="3200" dirty="0" err="1">
+                <a:latin typeface="Calibri" charset="0"/>
+              </a:rPr>
+              <a:t>git</a:t>
+            </a:r>
+            <a:r>
+              <a:rPr lang="en-US" sz="3200" dirty="0">
+                <a:latin typeface="Calibri" charset="0"/>
+              </a:rPr>
+              <a:t> repository lives on </a:t>
+            </a:r>
+            <a:r>
+              <a:rPr lang="en-US" sz="3200" dirty="0" err="1">
+                <a:latin typeface="Calibri" charset="0"/>
+              </a:rPr>
+              <a:t>GitHub.com</a:t>
+            </a:r>
+            <a:endParaRPr lang="en-US" sz="3200" dirty="0">
+              <a:latin typeface="Calibri" charset="0"/>
+            </a:endParaRPr>
+          </a:p>
+          <a:p>
+            <a:pPr lvl="1">
               <a:spcBef>
                 <a:spcPts val="800"/>
               </a:spcBef>
@@ -6964,20 +6850,14 @@
               <a:defRPr/>
             </a:pPr>
             <a:r>
-              <a:rPr lang="en-US" dirty="0" err="1">
+              <a:rPr lang="en-US" sz="3200" dirty="0">
                 <a:latin typeface="Calibri" charset="0"/>
               </a:rPr>
-              <a:t>Git</a:t>
-            </a:r>
-            <a:r>
-              <a:rPr lang="en-US" dirty="0">
-                <a:latin typeface="Calibri" charset="0"/>
-              </a:rPr>
-              <a:t> is better than all previous version control tools (in my opinion, and I’ve used quite a few)</a:t>
-            </a:r>
-          </a:p>
-          <a:p>
-            <a:pPr>
+              <a:t>Other people can download and use your code</a:t>
+            </a:r>
+          </a:p>
+          <a:p>
+            <a:pPr lvl="1">
               <a:spcBef>
                 <a:spcPts val="800"/>
               </a:spcBef>
@@ -6985,9 +6865,28 @@
               <a:buChar char="•"/>
               <a:defRPr/>
             </a:pPr>
-            <a:endParaRPr lang="en-US" dirty="0">
-              <a:latin typeface="Calibri" charset="0"/>
-            </a:endParaRPr>
+            <a:r>
+              <a:rPr lang="en-US" sz="3200" dirty="0">
+                <a:latin typeface="Calibri" charset="0"/>
+              </a:rPr>
+              <a:t>There is an issue tracker for your code</a:t>
+            </a:r>
+          </a:p>
+          <a:p>
+            <a:pPr lvl="1">
+              <a:spcBef>
+                <a:spcPts val="800"/>
+              </a:spcBef>
+              <a:buFont typeface="Arial" charset="0"/>
+              <a:buChar char="•"/>
+              <a:defRPr/>
+            </a:pPr>
+            <a:r>
+              <a:rPr lang="en-US" sz="3200" dirty="0">
+                <a:latin typeface="Calibri" charset="0"/>
+              </a:rPr>
+              <a:t>You can develop code collaboratively using GitHub</a:t>
+            </a:r>
           </a:p>
           <a:p>
             <a:endParaRPr lang="en-US" dirty="0"/>
@@ -6997,7 +6896,7 @@
     </p:spTree>
     <p:extLst>
       <p:ext uri="{BB962C8B-B14F-4D97-AF65-F5344CB8AC3E}">
-        <p14:creationId xmlns:p14="http://schemas.microsoft.com/office/powerpoint/2010/main" val="503709198"/>
+        <p14:creationId xmlns:p14="http://schemas.microsoft.com/office/powerpoint/2010/main" val="1819760004"/>
       </p:ext>
     </p:extLst>
   </p:cSld>
@@ -7041,190 +6940,6 @@
           <a:p>
             <a:r>
               <a:rPr lang="en-US" dirty="0"/>
-              <a:t>What is GitHub?</a:t>
-            </a:r>
-          </a:p>
-        </p:txBody>
-      </p:sp>
-      <p:sp>
-        <p:nvSpPr>
-          <p:cNvPr id="3" name="Content Placeholder 2"/>
-          <p:cNvSpPr>
-            <a:spLocks noGrp="1"/>
-          </p:cNvSpPr>
-          <p:nvPr>
-            <p:ph idx="1"/>
-          </p:nvPr>
-        </p:nvSpPr>
-        <p:spPr/>
-        <p:txBody>
-          <a:bodyPr/>
-          <a:lstStyle/>
-          <a:p>
-            <a:pPr>
-              <a:spcBef>
-                <a:spcPts val="800"/>
-              </a:spcBef>
-              <a:buFont typeface="Arial" charset="0"/>
-              <a:buChar char="•"/>
-              <a:defRPr/>
-            </a:pPr>
-            <a:r>
-              <a:rPr lang="en-US" dirty="0">
-                <a:latin typeface="Calibri" charset="0"/>
-              </a:rPr>
-              <a:t>‘</a:t>
-            </a:r>
-            <a:r>
-              <a:rPr lang="en-US" dirty="0" err="1">
-                <a:latin typeface="Calibri" charset="0"/>
-              </a:rPr>
-              <a:t>Git</a:t>
-            </a:r>
-            <a:r>
-              <a:rPr lang="en-US" dirty="0">
-                <a:latin typeface="Calibri" charset="0"/>
-              </a:rPr>
-              <a:t> in the cloud’</a:t>
-            </a:r>
-          </a:p>
-          <a:p>
-            <a:pPr lvl="1">
-              <a:spcBef>
-                <a:spcPts val="800"/>
-              </a:spcBef>
-              <a:buFont typeface="Arial" charset="0"/>
-              <a:buChar char="•"/>
-              <a:defRPr/>
-            </a:pPr>
-            <a:r>
-              <a:rPr lang="en-US" sz="3200" dirty="0">
-                <a:latin typeface="Calibri" charset="0"/>
-              </a:rPr>
-              <a:t>Your </a:t>
-            </a:r>
-            <a:r>
-              <a:rPr lang="en-US" sz="3200" dirty="0" err="1">
-                <a:latin typeface="Calibri" charset="0"/>
-              </a:rPr>
-              <a:t>git</a:t>
-            </a:r>
-            <a:r>
-              <a:rPr lang="en-US" sz="3200" dirty="0">
-                <a:latin typeface="Calibri" charset="0"/>
-              </a:rPr>
-              <a:t> repository lives on </a:t>
-            </a:r>
-            <a:r>
-              <a:rPr lang="en-US" sz="3200" dirty="0" err="1">
-                <a:latin typeface="Calibri" charset="0"/>
-              </a:rPr>
-              <a:t>GitHub.com</a:t>
-            </a:r>
-            <a:endParaRPr lang="en-US" sz="3200" dirty="0">
-              <a:latin typeface="Calibri" charset="0"/>
-            </a:endParaRPr>
-          </a:p>
-          <a:p>
-            <a:pPr lvl="1">
-              <a:spcBef>
-                <a:spcPts val="800"/>
-              </a:spcBef>
-              <a:buFont typeface="Arial" charset="0"/>
-              <a:buChar char="•"/>
-              <a:defRPr/>
-            </a:pPr>
-            <a:r>
-              <a:rPr lang="en-US" sz="3200" dirty="0">
-                <a:latin typeface="Calibri" charset="0"/>
-              </a:rPr>
-              <a:t>Other people can download and use your code</a:t>
-            </a:r>
-          </a:p>
-          <a:p>
-            <a:pPr lvl="1">
-              <a:spcBef>
-                <a:spcPts val="800"/>
-              </a:spcBef>
-              <a:buFont typeface="Arial" charset="0"/>
-              <a:buChar char="•"/>
-              <a:defRPr/>
-            </a:pPr>
-            <a:r>
-              <a:rPr lang="en-US" sz="3200" dirty="0">
-                <a:latin typeface="Calibri" charset="0"/>
-              </a:rPr>
-              <a:t>There is an issue tracker for your code</a:t>
-            </a:r>
-          </a:p>
-          <a:p>
-            <a:pPr lvl="1">
-              <a:spcBef>
-                <a:spcPts val="800"/>
-              </a:spcBef>
-              <a:buFont typeface="Arial" charset="0"/>
-              <a:buChar char="•"/>
-              <a:defRPr/>
-            </a:pPr>
-            <a:r>
-              <a:rPr lang="en-US" sz="3200" dirty="0">
-                <a:latin typeface="Calibri" charset="0"/>
-              </a:rPr>
-              <a:t>You can develop code collaboratively using GitHub</a:t>
-            </a:r>
-          </a:p>
-          <a:p>
-            <a:endParaRPr lang="en-US" dirty="0"/>
-          </a:p>
-        </p:txBody>
-      </p:sp>
-    </p:spTree>
-    <p:extLst>
-      <p:ext uri="{BB962C8B-B14F-4D97-AF65-F5344CB8AC3E}">
-        <p14:creationId xmlns:p14="http://schemas.microsoft.com/office/powerpoint/2010/main" val="1819760004"/>
-      </p:ext>
-    </p:extLst>
-  </p:cSld>
-  <p:clrMapOvr>
-    <a:masterClrMapping/>
-  </p:clrMapOvr>
-</p:sld>
-</file>
-
-<file path=ppt/slides/slide17.xml><?xml version="1.0" encoding="utf-8"?>
-<p:sld xmlns:a="http://schemas.openxmlformats.org/drawingml/2006/main" xmlns:r="http://schemas.openxmlformats.org/officeDocument/2006/relationships" xmlns:p="http://schemas.openxmlformats.org/presentationml/2006/main">
-  <p:cSld>
-    <p:spTree>
-      <p:nvGrpSpPr>
-        <p:cNvPr id="1" name=""/>
-        <p:cNvGrpSpPr/>
-        <p:nvPr/>
-      </p:nvGrpSpPr>
-      <p:grpSpPr>
-        <a:xfrm>
-          <a:off x="0" y="0"/>
-          <a:ext cx="0" cy="0"/>
-          <a:chOff x="0" y="0"/>
-          <a:chExt cx="0" cy="0"/>
-        </a:xfrm>
-      </p:grpSpPr>
-      <p:sp>
-        <p:nvSpPr>
-          <p:cNvPr id="2" name="Title 1"/>
-          <p:cNvSpPr>
-            <a:spLocks noGrp="1"/>
-          </p:cNvSpPr>
-          <p:nvPr>
-            <p:ph type="title"/>
-          </p:nvPr>
-        </p:nvSpPr>
-        <p:spPr/>
-        <p:txBody>
-          <a:bodyPr/>
-          <a:lstStyle/>
-          <a:p>
-            <a:r>
-              <a:rPr lang="en-US" dirty="0"/>
               <a:t>Hands on demo!</a:t>
             </a:r>
           </a:p>
@@ -7281,7 +6996,7 @@
 </p:sld>
 </file>
 
-<file path=ppt/slides/slide18.xml><?xml version="1.0" encoding="utf-8"?>
+<file path=ppt/slides/slide17.xml><?xml version="1.0" encoding="utf-8"?>
 <p:sld xmlns:a="http://schemas.openxmlformats.org/drawingml/2006/main" xmlns:r="http://schemas.openxmlformats.org/officeDocument/2006/relationships" xmlns:p="http://schemas.openxmlformats.org/presentationml/2006/main">
   <p:cSld>
     <p:spTree>
@@ -7326,6 +7041,88 @@
     <p:extLst>
       <p:ext uri="{BB962C8B-B14F-4D97-AF65-F5344CB8AC3E}">
         <p14:creationId xmlns:p14="http://schemas.microsoft.com/office/powerpoint/2010/main" val="939614745"/>
+      </p:ext>
+    </p:extLst>
+  </p:cSld>
+  <p:clrMapOvr>
+    <a:masterClrMapping/>
+  </p:clrMapOvr>
+  <p:transition spd="med"/>
+  <p:timing>
+    <p:tnLst>
+      <p:par>
+        <p:cTn id="1" dur="indefinite" restart="never" nodeType="tmRoot">
+          <p:childTnLst>
+            <p:seq concurrent="1" nextAc="seek">
+              <p:cTn id="2" dur="0" nodeType="mainSeq"/>
+              <p:prevCondLst>
+                <p:cond evt="onPrev" delay="0">
+                  <p:tgtEl>
+                    <p:sldTgt/>
+                  </p:tgtEl>
+                </p:cond>
+              </p:prevCondLst>
+              <p:nextCondLst>
+                <p:cond evt="onNext" delay="0">
+                  <p:tgtEl>
+                    <p:sldTgt/>
+                  </p:tgtEl>
+                </p:cond>
+              </p:nextCondLst>
+            </p:seq>
+          </p:childTnLst>
+        </p:cTn>
+      </p:par>
+    </p:tnLst>
+  </p:timing>
+</p:sld>
+</file>
+
+<file path=ppt/slides/slide18.xml><?xml version="1.0" encoding="utf-8"?>
+<p:sld xmlns:a="http://schemas.openxmlformats.org/drawingml/2006/main" xmlns:r="http://schemas.openxmlformats.org/officeDocument/2006/relationships" xmlns:p="http://schemas.openxmlformats.org/presentationml/2006/main">
+  <p:cSld>
+    <p:spTree>
+      <p:nvGrpSpPr>
+        <p:cNvPr id="1" name=""/>
+        <p:cNvGrpSpPr/>
+        <p:nvPr/>
+      </p:nvGrpSpPr>
+      <p:grpSpPr>
+        <a:xfrm>
+          <a:off x="0" y="0"/>
+          <a:ext cx="0" cy="0"/>
+          <a:chOff x="0" y="0"/>
+          <a:chExt cx="0" cy="0"/>
+        </a:xfrm>
+      </p:grpSpPr>
+      <p:pic>
+        <p:nvPicPr>
+          <p:cNvPr id="4" name="Picture 3"/>
+          <p:cNvPicPr>
+            <a:picLocks noChangeAspect="1"/>
+          </p:cNvPicPr>
+          <p:nvPr/>
+        </p:nvPicPr>
+        <p:blipFill>
+          <a:blip r:embed="rId3"/>
+          <a:stretch>
+            <a:fillRect/>
+          </a:stretch>
+        </p:blipFill>
+        <p:spPr>
+          <a:xfrm>
+            <a:off x="508000" y="977900"/>
+            <a:ext cx="8115300" cy="4902200"/>
+          </a:xfrm>
+          <a:prstGeom prst="rect">
+            <a:avLst/>
+          </a:prstGeom>
+        </p:spPr>
+      </p:pic>
+    </p:spTree>
+    <p:extLst>
+      <p:ext uri="{BB962C8B-B14F-4D97-AF65-F5344CB8AC3E}">
+        <p14:creationId xmlns:p14="http://schemas.microsoft.com/office/powerpoint/2010/main" val="566946790"/>
       </p:ext>
     </p:extLst>
   </p:cSld>
@@ -7382,7 +7179,7 @@
       </p:grpSpPr>
       <p:pic>
         <p:nvPicPr>
-          <p:cNvPr id="4" name="Picture 3"/>
+          <p:cNvPr id="2" name="Picture 1"/>
           <p:cNvPicPr>
             <a:picLocks noChangeAspect="1"/>
           </p:cNvPicPr>
@@ -7396,8 +7193,8 @@
         </p:blipFill>
         <p:spPr>
           <a:xfrm>
-            <a:off x="508000" y="977900"/>
-            <a:ext cx="8115300" cy="4902200"/>
+            <a:off x="901700" y="952500"/>
+            <a:ext cx="7340600" cy="4940300"/>
           </a:xfrm>
           <a:prstGeom prst="rect">
             <a:avLst/>
@@ -7407,7 +7204,7 @@
     </p:spTree>
     <p:extLst>
       <p:ext uri="{BB962C8B-B14F-4D97-AF65-F5344CB8AC3E}">
-        <p14:creationId xmlns:p14="http://schemas.microsoft.com/office/powerpoint/2010/main" val="566946790"/>
+        <p14:creationId xmlns:p14="http://schemas.microsoft.com/office/powerpoint/2010/main" val="1613765588"/>
       </p:ext>
     </p:extLst>
   </p:cSld>
@@ -7521,10 +7318,10 @@
       </p:sp>
       <p:pic>
         <p:nvPicPr>
-          <p:cNvPr id="5" name="Picture 4">
+          <p:cNvPr id="6" name="Picture 5">
             <a:extLst>
               <a:ext uri="{FF2B5EF4-FFF2-40B4-BE49-F238E27FC236}">
-                <a16:creationId xmlns:a16="http://schemas.microsoft.com/office/drawing/2014/main" id="{D6AABC0A-84C2-884E-B25D-870DF8093B97}"/>
+                <a16:creationId xmlns:a16="http://schemas.microsoft.com/office/drawing/2014/main" id="{12196E8E-ABC1-45CF-80FA-541D5B0440CE}"/>
               </a:ext>
             </a:extLst>
           </p:cNvPr>
@@ -7541,8 +7338,8 @@
         </p:blipFill>
         <p:spPr>
           <a:xfrm>
-            <a:off x="742462" y="2583960"/>
-            <a:ext cx="7534030" cy="4201671"/>
+            <a:off x="878358" y="2786109"/>
+            <a:ext cx="7387284" cy="4053825"/>
           </a:xfrm>
           <a:prstGeom prst="rect">
             <a:avLst/>
@@ -7581,7 +7378,7 @@
       </p:grpSpPr>
       <p:pic>
         <p:nvPicPr>
-          <p:cNvPr id="2" name="Picture 1"/>
+          <p:cNvPr id="4" name="Picture 3"/>
           <p:cNvPicPr>
             <a:picLocks noChangeAspect="1"/>
           </p:cNvPicPr>
@@ -7595,8 +7392,8 @@
         </p:blipFill>
         <p:spPr>
           <a:xfrm>
-            <a:off x="901700" y="952500"/>
-            <a:ext cx="7340600" cy="4940300"/>
+            <a:off x="0" y="2336800"/>
+            <a:ext cx="9144000" cy="2163223"/>
           </a:xfrm>
           <a:prstGeom prst="rect">
             <a:avLst/>
@@ -7606,7 +7403,7 @@
     </p:spTree>
     <p:extLst>
       <p:ext uri="{BB962C8B-B14F-4D97-AF65-F5344CB8AC3E}">
-        <p14:creationId xmlns:p14="http://schemas.microsoft.com/office/powerpoint/2010/main" val="1613765588"/>
+        <p14:creationId xmlns:p14="http://schemas.microsoft.com/office/powerpoint/2010/main" val="58145480"/>
       </p:ext>
     </p:extLst>
   </p:cSld>
@@ -7663,7 +7460,7 @@
       </p:grpSpPr>
       <p:pic>
         <p:nvPicPr>
-          <p:cNvPr id="4" name="Picture 3"/>
+          <p:cNvPr id="2" name="Picture 1"/>
           <p:cNvPicPr>
             <a:picLocks noChangeAspect="1"/>
           </p:cNvPicPr>
@@ -7677,8 +7474,8 @@
         </p:blipFill>
         <p:spPr>
           <a:xfrm>
-            <a:off x="0" y="2336800"/>
-            <a:ext cx="9144000" cy="2163223"/>
+            <a:off x="0" y="774700"/>
+            <a:ext cx="9144000" cy="5294489"/>
           </a:xfrm>
           <a:prstGeom prst="rect">
             <a:avLst/>
@@ -7688,7 +7485,7 @@
     </p:spTree>
     <p:extLst>
       <p:ext uri="{BB962C8B-B14F-4D97-AF65-F5344CB8AC3E}">
-        <p14:creationId xmlns:p14="http://schemas.microsoft.com/office/powerpoint/2010/main" val="58145480"/>
+        <p14:creationId xmlns:p14="http://schemas.microsoft.com/office/powerpoint/2010/main" val="1781815951"/>
       </p:ext>
     </p:extLst>
   </p:cSld>
@@ -7745,7 +7542,7 @@
       </p:grpSpPr>
       <p:pic>
         <p:nvPicPr>
-          <p:cNvPr id="2" name="Picture 1"/>
+          <p:cNvPr id="4" name="Picture 3"/>
           <p:cNvPicPr>
             <a:picLocks noChangeAspect="1"/>
           </p:cNvPicPr>
@@ -7759,8 +7556,8 @@
         </p:blipFill>
         <p:spPr>
           <a:xfrm>
-            <a:off x="0" y="774700"/>
-            <a:ext cx="9144000" cy="5294489"/>
+            <a:off x="0" y="800100"/>
+            <a:ext cx="9144000" cy="5235048"/>
           </a:xfrm>
           <a:prstGeom prst="rect">
             <a:avLst/>
@@ -7770,7 +7567,7 @@
     </p:spTree>
     <p:extLst>
       <p:ext uri="{BB962C8B-B14F-4D97-AF65-F5344CB8AC3E}">
-        <p14:creationId xmlns:p14="http://schemas.microsoft.com/office/powerpoint/2010/main" val="1781815951"/>
+        <p14:creationId xmlns:p14="http://schemas.microsoft.com/office/powerpoint/2010/main" val="156234336"/>
       </p:ext>
     </p:extLst>
   </p:cSld>
@@ -7827,7 +7624,7 @@
       </p:grpSpPr>
       <p:pic>
         <p:nvPicPr>
-          <p:cNvPr id="4" name="Picture 3"/>
+          <p:cNvPr id="2" name="Picture 1"/>
           <p:cNvPicPr>
             <a:picLocks noChangeAspect="1"/>
           </p:cNvPicPr>
@@ -7841,8 +7638,8 @@
         </p:blipFill>
         <p:spPr>
           <a:xfrm>
-            <a:off x="0" y="800100"/>
-            <a:ext cx="9144000" cy="5235048"/>
+            <a:off x="444500" y="12700"/>
+            <a:ext cx="8255000" cy="6819900"/>
           </a:xfrm>
           <a:prstGeom prst="rect">
             <a:avLst/>
@@ -7852,7 +7649,7 @@
     </p:spTree>
     <p:extLst>
       <p:ext uri="{BB962C8B-B14F-4D97-AF65-F5344CB8AC3E}">
-        <p14:creationId xmlns:p14="http://schemas.microsoft.com/office/powerpoint/2010/main" val="156234336"/>
+        <p14:creationId xmlns:p14="http://schemas.microsoft.com/office/powerpoint/2010/main" val="2124841118"/>
       </p:ext>
     </p:extLst>
   </p:cSld>
@@ -7909,7 +7706,7 @@
       </p:grpSpPr>
       <p:pic>
         <p:nvPicPr>
-          <p:cNvPr id="2" name="Picture 1"/>
+          <p:cNvPr id="5" name="Picture 4"/>
           <p:cNvPicPr>
             <a:picLocks noChangeAspect="1"/>
           </p:cNvPicPr>
@@ -7923,8 +7720,8 @@
         </p:blipFill>
         <p:spPr>
           <a:xfrm>
-            <a:off x="444500" y="12700"/>
-            <a:ext cx="8255000" cy="6819900"/>
+            <a:off x="3238500" y="2286000"/>
+            <a:ext cx="2654300" cy="2286000"/>
           </a:xfrm>
           <a:prstGeom prst="rect">
             <a:avLst/>
@@ -7934,7 +7731,7 @@
     </p:spTree>
     <p:extLst>
       <p:ext uri="{BB962C8B-B14F-4D97-AF65-F5344CB8AC3E}">
-        <p14:creationId xmlns:p14="http://schemas.microsoft.com/office/powerpoint/2010/main" val="2124841118"/>
+        <p14:creationId xmlns:p14="http://schemas.microsoft.com/office/powerpoint/2010/main" val="1755294082"/>
       </p:ext>
     </p:extLst>
   </p:cSld>
@@ -7991,7 +7788,7 @@
       </p:grpSpPr>
       <p:pic>
         <p:nvPicPr>
-          <p:cNvPr id="5" name="Picture 4"/>
+          <p:cNvPr id="2" name="Picture 1"/>
           <p:cNvPicPr>
             <a:picLocks noChangeAspect="1"/>
           </p:cNvPicPr>
@@ -8005,8 +7802,8 @@
         </p:blipFill>
         <p:spPr>
           <a:xfrm>
-            <a:off x="3238500" y="2286000"/>
-            <a:ext cx="2654300" cy="2286000"/>
+            <a:off x="0" y="393700"/>
+            <a:ext cx="9144000" cy="6046470"/>
           </a:xfrm>
           <a:prstGeom prst="rect">
             <a:avLst/>
@@ -8016,7 +7813,7 @@
     </p:spTree>
     <p:extLst>
       <p:ext uri="{BB962C8B-B14F-4D97-AF65-F5344CB8AC3E}">
-        <p14:creationId xmlns:p14="http://schemas.microsoft.com/office/powerpoint/2010/main" val="1755294082"/>
+        <p14:creationId xmlns:p14="http://schemas.microsoft.com/office/powerpoint/2010/main" val="186980271"/>
       </p:ext>
     </p:extLst>
   </p:cSld>
@@ -8073,7 +7870,7 @@
       </p:grpSpPr>
       <p:pic>
         <p:nvPicPr>
-          <p:cNvPr id="2" name="Picture 1"/>
+          <p:cNvPr id="4" name="Picture 3"/>
           <p:cNvPicPr>
             <a:picLocks noChangeAspect="1"/>
           </p:cNvPicPr>
@@ -8087,8 +7884,8 @@
         </p:blipFill>
         <p:spPr>
           <a:xfrm>
-            <a:off x="0" y="393700"/>
-            <a:ext cx="9144000" cy="6046470"/>
+            <a:off x="0" y="1968500"/>
+            <a:ext cx="9144000" cy="2904024"/>
           </a:xfrm>
           <a:prstGeom prst="rect">
             <a:avLst/>
@@ -8098,7 +7895,7 @@
     </p:spTree>
     <p:extLst>
       <p:ext uri="{BB962C8B-B14F-4D97-AF65-F5344CB8AC3E}">
-        <p14:creationId xmlns:p14="http://schemas.microsoft.com/office/powerpoint/2010/main" val="186980271"/>
+        <p14:creationId xmlns:p14="http://schemas.microsoft.com/office/powerpoint/2010/main" val="587873242"/>
       </p:ext>
     </p:extLst>
   </p:cSld>
@@ -8155,7 +7952,7 @@
       </p:grpSpPr>
       <p:pic>
         <p:nvPicPr>
-          <p:cNvPr id="4" name="Picture 3"/>
+          <p:cNvPr id="2" name="Picture 1"/>
           <p:cNvPicPr>
             <a:picLocks noChangeAspect="1"/>
           </p:cNvPicPr>
@@ -8169,8 +7966,8 @@
         </p:blipFill>
         <p:spPr>
           <a:xfrm>
-            <a:off x="0" y="1968500"/>
-            <a:ext cx="9144000" cy="2904024"/>
+            <a:off x="1104900" y="0"/>
+            <a:ext cx="6910485" cy="6858000"/>
           </a:xfrm>
           <a:prstGeom prst="rect">
             <a:avLst/>
@@ -8180,7 +7977,7 @@
     </p:spTree>
     <p:extLst>
       <p:ext uri="{BB962C8B-B14F-4D97-AF65-F5344CB8AC3E}">
-        <p14:creationId xmlns:p14="http://schemas.microsoft.com/office/powerpoint/2010/main" val="587873242"/>
+        <p14:creationId xmlns:p14="http://schemas.microsoft.com/office/powerpoint/2010/main" val="2064230643"/>
       </p:ext>
     </p:extLst>
   </p:cSld>
@@ -8237,7 +8034,7 @@
       </p:grpSpPr>
       <p:pic>
         <p:nvPicPr>
-          <p:cNvPr id="2" name="Picture 1"/>
+          <p:cNvPr id="4" name="Picture 3"/>
           <p:cNvPicPr>
             <a:picLocks noChangeAspect="1"/>
           </p:cNvPicPr>
@@ -8251,8 +8048,8 @@
         </p:blipFill>
         <p:spPr>
           <a:xfrm>
-            <a:off x="1104900" y="0"/>
-            <a:ext cx="6910485" cy="6858000"/>
+            <a:off x="622300" y="0"/>
+            <a:ext cx="7879136" cy="6858000"/>
           </a:xfrm>
           <a:prstGeom prst="rect">
             <a:avLst/>
@@ -8262,7 +8059,7 @@
     </p:spTree>
     <p:extLst>
       <p:ext uri="{BB962C8B-B14F-4D97-AF65-F5344CB8AC3E}">
-        <p14:creationId xmlns:p14="http://schemas.microsoft.com/office/powerpoint/2010/main" val="2064230643"/>
+        <p14:creationId xmlns:p14="http://schemas.microsoft.com/office/powerpoint/2010/main" val="2142256303"/>
       </p:ext>
     </p:extLst>
   </p:cSld>
@@ -8319,205 +8116,6 @@
       </p:grpSpPr>
       <p:pic>
         <p:nvPicPr>
-          <p:cNvPr id="4" name="Picture 3"/>
-          <p:cNvPicPr>
-            <a:picLocks noChangeAspect="1"/>
-          </p:cNvPicPr>
-          <p:nvPr/>
-        </p:nvPicPr>
-        <p:blipFill>
-          <a:blip r:embed="rId3"/>
-          <a:stretch>
-            <a:fillRect/>
-          </a:stretch>
-        </p:blipFill>
-        <p:spPr>
-          <a:xfrm>
-            <a:off x="622300" y="0"/>
-            <a:ext cx="7879136" cy="6858000"/>
-          </a:xfrm>
-          <a:prstGeom prst="rect">
-            <a:avLst/>
-          </a:prstGeom>
-        </p:spPr>
-      </p:pic>
-    </p:spTree>
-    <p:extLst>
-      <p:ext uri="{BB962C8B-B14F-4D97-AF65-F5344CB8AC3E}">
-        <p14:creationId xmlns:p14="http://schemas.microsoft.com/office/powerpoint/2010/main" val="2142256303"/>
-      </p:ext>
-    </p:extLst>
-  </p:cSld>
-  <p:clrMapOvr>
-    <a:masterClrMapping/>
-  </p:clrMapOvr>
-  <p:transition spd="med"/>
-  <p:timing>
-    <p:tnLst>
-      <p:par>
-        <p:cTn id="1" dur="indefinite" restart="never" nodeType="tmRoot">
-          <p:childTnLst>
-            <p:seq concurrent="1" nextAc="seek">
-              <p:cTn id="2" dur="0" nodeType="mainSeq"/>
-              <p:prevCondLst>
-                <p:cond evt="onPrev" delay="0">
-                  <p:tgtEl>
-                    <p:sldTgt/>
-                  </p:tgtEl>
-                </p:cond>
-              </p:prevCondLst>
-              <p:nextCondLst>
-                <p:cond evt="onNext" delay="0">
-                  <p:tgtEl>
-                    <p:sldTgt/>
-                  </p:tgtEl>
-                </p:cond>
-              </p:nextCondLst>
-            </p:seq>
-          </p:childTnLst>
-        </p:cTn>
-      </p:par>
-    </p:tnLst>
-  </p:timing>
-</p:sld>
-</file>
-
-<file path=ppt/slides/slide3.xml><?xml version="1.0" encoding="utf-8"?>
-<p:sld xmlns:a="http://schemas.openxmlformats.org/drawingml/2006/main" xmlns:r="http://schemas.openxmlformats.org/officeDocument/2006/relationships" xmlns:p="http://schemas.openxmlformats.org/presentationml/2006/main">
-  <p:cSld>
-    <p:spTree>
-      <p:nvGrpSpPr>
-        <p:cNvPr id="1" name=""/>
-        <p:cNvGrpSpPr/>
-        <p:nvPr/>
-      </p:nvGrpSpPr>
-      <p:grpSpPr>
-        <a:xfrm>
-          <a:off x="0" y="0"/>
-          <a:ext cx="0" cy="0"/>
-          <a:chOff x="0" y="0"/>
-          <a:chExt cx="0" cy="0"/>
-        </a:xfrm>
-      </p:grpSpPr>
-      <p:sp>
-        <p:nvSpPr>
-          <p:cNvPr id="2" name="Title 1"/>
-          <p:cNvSpPr>
-            <a:spLocks noGrp="1"/>
-          </p:cNvSpPr>
-          <p:nvPr>
-            <p:ph type="title"/>
-          </p:nvPr>
-        </p:nvSpPr>
-        <p:spPr/>
-        <p:txBody>
-          <a:bodyPr/>
-          <a:lstStyle/>
-          <a:p>
-            <a:r>
-              <a:rPr lang="en-US" dirty="0"/>
-              <a:t>Before we begin…</a:t>
-            </a:r>
-          </a:p>
-        </p:txBody>
-      </p:sp>
-      <p:sp>
-        <p:nvSpPr>
-          <p:cNvPr id="3" name="Content Placeholder 2"/>
-          <p:cNvSpPr>
-            <a:spLocks noGrp="1"/>
-          </p:cNvSpPr>
-          <p:nvPr>
-            <p:ph idx="1"/>
-          </p:nvPr>
-        </p:nvSpPr>
-        <p:spPr/>
-        <p:txBody>
-          <a:bodyPr/>
-          <a:lstStyle/>
-          <a:p>
-            <a:pPr>
-              <a:spcBef>
-                <a:spcPts val="800"/>
-              </a:spcBef>
-              <a:buFont typeface="Arial" charset="0"/>
-              <a:buChar char="•"/>
-              <a:defRPr/>
-            </a:pPr>
-            <a:r>
-              <a:rPr lang="en-US" dirty="0">
-                <a:latin typeface="Calibri" charset="0"/>
-              </a:rPr>
-              <a:t>Thank you for taking the class organization survey</a:t>
-            </a:r>
-          </a:p>
-          <a:p>
-            <a:endParaRPr lang="en-US" dirty="0"/>
-          </a:p>
-        </p:txBody>
-      </p:sp>
-      <p:pic>
-        <p:nvPicPr>
-          <p:cNvPr id="4" name="Picture 3">
-            <a:extLst>
-              <a:ext uri="{FF2B5EF4-FFF2-40B4-BE49-F238E27FC236}">
-                <a16:creationId xmlns:a16="http://schemas.microsoft.com/office/drawing/2014/main" id="{E184CBA3-275A-CB4B-B56D-C9B42605029D}"/>
-              </a:ext>
-            </a:extLst>
-          </p:cNvPr>
-          <p:cNvPicPr>
-            <a:picLocks noChangeAspect="1"/>
-          </p:cNvPicPr>
-          <p:nvPr/>
-        </p:nvPicPr>
-        <p:blipFill>
-          <a:blip r:embed="rId2"/>
-          <a:stretch>
-            <a:fillRect/>
-          </a:stretch>
-        </p:blipFill>
-        <p:spPr>
-          <a:xfrm>
-            <a:off x="859691" y="2590800"/>
-            <a:ext cx="7651531" cy="4267200"/>
-          </a:xfrm>
-          <a:prstGeom prst="rect">
-            <a:avLst/>
-          </a:prstGeom>
-        </p:spPr>
-      </p:pic>
-    </p:spTree>
-    <p:extLst>
-      <p:ext uri="{BB962C8B-B14F-4D97-AF65-F5344CB8AC3E}">
-        <p14:creationId xmlns:p14="http://schemas.microsoft.com/office/powerpoint/2010/main" val="3620178978"/>
-      </p:ext>
-    </p:extLst>
-  </p:cSld>
-  <p:clrMapOvr>
-    <a:masterClrMapping/>
-  </p:clrMapOvr>
-</p:sld>
-</file>
-
-<file path=ppt/slides/slide30.xml><?xml version="1.0" encoding="utf-8"?>
-<p:sld xmlns:a="http://schemas.openxmlformats.org/drawingml/2006/main" xmlns:r="http://schemas.openxmlformats.org/officeDocument/2006/relationships" xmlns:p="http://schemas.openxmlformats.org/presentationml/2006/main">
-  <p:cSld>
-    <p:spTree>
-      <p:nvGrpSpPr>
-        <p:cNvPr id="1" name=""/>
-        <p:cNvGrpSpPr/>
-        <p:nvPr/>
-      </p:nvGrpSpPr>
-      <p:grpSpPr>
-        <a:xfrm>
-          <a:off x="0" y="0"/>
-          <a:ext cx="0" cy="0"/>
-          <a:chOff x="0" y="0"/>
-          <a:chExt cx="0" cy="0"/>
-        </a:xfrm>
-      </p:grpSpPr>
-      <p:pic>
-        <p:nvPicPr>
           <p:cNvPr id="2" name="Picture 1"/>
           <p:cNvPicPr>
             <a:picLocks noChangeAspect="1"/>
@@ -8553,7 +8151,7 @@
 </p:sld>
 </file>
 
-<file path=ppt/slides/slide4.xml><?xml version="1.0" encoding="utf-8"?>
+<file path=ppt/slides/slide3.xml><?xml version="1.0" encoding="utf-8"?>
 <p:sld xmlns:a="http://schemas.openxmlformats.org/drawingml/2006/main" xmlns:r="http://schemas.openxmlformats.org/officeDocument/2006/relationships" xmlns:p="http://schemas.openxmlformats.org/presentationml/2006/main">
   <p:cSld>
     <p:spTree>
@@ -9316,7 +8914,7 @@
 </p:sld>
 </file>
 
-<file path=ppt/slides/slide5.xml><?xml version="1.0" encoding="utf-8"?>
+<file path=ppt/slides/slide4.xml><?xml version="1.0" encoding="utf-8"?>
 <p:sld xmlns:a="http://schemas.openxmlformats.org/drawingml/2006/main" xmlns:r="http://schemas.openxmlformats.org/officeDocument/2006/relationships" xmlns:p="http://schemas.openxmlformats.org/presentationml/2006/main">
   <p:cSld>
     <p:spTree>
@@ -9424,6 +9022,128 @@
 </p:sld>
 </file>
 
+<file path=ppt/slides/slide5.xml><?xml version="1.0" encoding="utf-8"?>
+<p:sld xmlns:a="http://schemas.openxmlformats.org/drawingml/2006/main" xmlns:r="http://schemas.openxmlformats.org/officeDocument/2006/relationships" xmlns:p="http://schemas.openxmlformats.org/presentationml/2006/main">
+  <p:cSld>
+    <p:spTree>
+      <p:nvGrpSpPr>
+        <p:cNvPr id="1" name=""/>
+        <p:cNvGrpSpPr/>
+        <p:nvPr/>
+      </p:nvGrpSpPr>
+      <p:grpSpPr>
+        <a:xfrm>
+          <a:off x="0" y="0"/>
+          <a:ext cx="0" cy="0"/>
+          <a:chOff x="0" y="0"/>
+          <a:chExt cx="0" cy="0"/>
+        </a:xfrm>
+      </p:grpSpPr>
+      <p:sp>
+        <p:nvSpPr>
+          <p:cNvPr id="2" name="Title 1"/>
+          <p:cNvSpPr>
+            <a:spLocks noGrp="1"/>
+          </p:cNvSpPr>
+          <p:nvPr>
+            <p:ph type="title"/>
+          </p:nvPr>
+        </p:nvSpPr>
+        <p:spPr/>
+        <p:txBody>
+          <a:bodyPr/>
+          <a:lstStyle/>
+          <a:p>
+            <a:r>
+              <a:rPr lang="en-US" dirty="0"/>
+              <a:t>What is version control?</a:t>
+            </a:r>
+          </a:p>
+        </p:txBody>
+      </p:sp>
+      <p:sp>
+        <p:nvSpPr>
+          <p:cNvPr id="3" name="Content Placeholder 2"/>
+          <p:cNvSpPr>
+            <a:spLocks noGrp="1"/>
+          </p:cNvSpPr>
+          <p:nvPr>
+            <p:ph idx="1"/>
+          </p:nvPr>
+        </p:nvSpPr>
+        <p:spPr/>
+        <p:txBody>
+          <a:bodyPr/>
+          <a:lstStyle/>
+          <a:p>
+            <a:pPr>
+              <a:spcBef>
+                <a:spcPts val="800"/>
+              </a:spcBef>
+              <a:buFont typeface="Arial" charset="0"/>
+              <a:buChar char="•"/>
+              <a:defRPr/>
+            </a:pPr>
+            <a:r>
+              <a:rPr lang="en-US" dirty="0">
+                <a:latin typeface="Calibri" charset="0"/>
+              </a:rPr>
+              <a:t>Writing a manuscript</a:t>
+            </a:r>
+            <a:r>
+              <a:rPr lang="is-IS" dirty="0">
+                <a:latin typeface="Calibri" charset="0"/>
+              </a:rPr>
+              <a:t>…</a:t>
+            </a:r>
+          </a:p>
+          <a:p>
+            <a:pPr lvl="1">
+              <a:spcBef>
+                <a:spcPts val="800"/>
+              </a:spcBef>
+              <a:buFont typeface="Arial" charset="0"/>
+              <a:buChar char="•"/>
+              <a:defRPr/>
+            </a:pPr>
+            <a:r>
+              <a:rPr lang="is-IS" sz="3200" dirty="0">
+                <a:latin typeface="Calibri" charset="0"/>
+              </a:rPr>
+              <a:t>Use undo to revert to a previous state</a:t>
+            </a:r>
+          </a:p>
+          <a:p>
+            <a:pPr lvl="1">
+              <a:spcBef>
+                <a:spcPts val="800"/>
+              </a:spcBef>
+              <a:buFont typeface="Arial" charset="0"/>
+              <a:buChar char="•"/>
+              <a:defRPr/>
+            </a:pPr>
+            <a:r>
+              <a:rPr lang="is-IS" sz="3200" dirty="0">
+                <a:latin typeface="Calibri" charset="0"/>
+              </a:rPr>
+              <a:t>Use track changes when sharing doc with your advisor</a:t>
+            </a:r>
+          </a:p>
+        </p:txBody>
+      </p:sp>
+    </p:spTree>
+    <p:extLst>
+      <p:ext uri="{BB962C8B-B14F-4D97-AF65-F5344CB8AC3E}">
+        <p14:creationId xmlns:p14="http://schemas.microsoft.com/office/powerpoint/2010/main" val="1500148518"/>
+      </p:ext>
+    </p:extLst>
+  </p:cSld>
+  <p:clrMapOvr>
+    <a:masterClrMapping/>
+  </p:clrMapOvr>
+</p:sld>
+</file>
+
 <file path=ppt/slides/slide6.xml><?xml version="1.0" encoding="utf-8"?>
 <p:sld xmlns:a="http://schemas.openxmlformats.org/drawingml/2006/main" xmlns:r="http://schemas.openxmlformats.org/officeDocument/2006/relationships" xmlns:p="http://schemas.openxmlformats.org/presentationml/2006/main">
   <p:cSld>
@@ -9456,10 +9176,7 @@
           <a:bodyPr/>
           <a:lstStyle/>
           <a:p>
-            <a:r>
-              <a:rPr lang="en-US" dirty="0"/>
-              <a:t>What is version control?</a:t>
-            </a:r>
+            <a:endParaRPr lang="en-US"/>
           </a:p>
         </p:txBody>
       </p:sp>
@@ -9478,65 +9195,38 @@
           <a:bodyPr/>
           <a:lstStyle/>
           <a:p>
-            <a:pPr>
-              <a:spcBef>
-                <a:spcPts val="800"/>
-              </a:spcBef>
-              <a:buFont typeface="Arial" charset="0"/>
-              <a:buChar char="•"/>
-              <a:defRPr/>
-            </a:pPr>
-            <a:r>
-              <a:rPr lang="en-US" dirty="0">
-                <a:latin typeface="Calibri" charset="0"/>
-              </a:rPr>
-              <a:t>Writing a manuscript</a:t>
-            </a:r>
-            <a:r>
-              <a:rPr lang="is-IS" dirty="0">
-                <a:latin typeface="Calibri" charset="0"/>
-              </a:rPr>
-              <a:t>…</a:t>
-            </a:r>
-          </a:p>
-          <a:p>
-            <a:pPr lvl="1">
-              <a:spcBef>
-                <a:spcPts val="800"/>
-              </a:spcBef>
-              <a:buFont typeface="Arial" charset="0"/>
-              <a:buChar char="•"/>
-              <a:defRPr/>
-            </a:pPr>
-            <a:r>
-              <a:rPr lang="is-IS" sz="3200" dirty="0">
-                <a:latin typeface="Calibri" charset="0"/>
-              </a:rPr>
-              <a:t>Use undo to revert to a previous state</a:t>
-            </a:r>
-          </a:p>
-          <a:p>
-            <a:pPr lvl="1">
-              <a:spcBef>
-                <a:spcPts val="800"/>
-              </a:spcBef>
-              <a:buFont typeface="Arial" charset="0"/>
-              <a:buChar char="•"/>
-              <a:defRPr/>
-            </a:pPr>
-            <a:r>
-              <a:rPr lang="is-IS" sz="3200" dirty="0">
-                <a:latin typeface="Calibri" charset="0"/>
-              </a:rPr>
-              <a:t>Use track changes when sharing doc with your advisor</a:t>
-            </a:r>
-          </a:p>
-        </p:txBody>
-      </p:sp>
+            <a:endParaRPr lang="en-US"/>
+          </a:p>
+        </p:txBody>
+      </p:sp>
+      <p:pic>
+        <p:nvPicPr>
+          <p:cNvPr id="4" name="Picture 3"/>
+          <p:cNvPicPr>
+            <a:picLocks noChangeAspect="1"/>
+          </p:cNvPicPr>
+          <p:nvPr/>
+        </p:nvPicPr>
+        <p:blipFill>
+          <a:blip r:embed="rId2"/>
+          <a:stretch>
+            <a:fillRect/>
+          </a:stretch>
+        </p:blipFill>
+        <p:spPr>
+          <a:xfrm>
+            <a:off x="2000250" y="0"/>
+            <a:ext cx="5143500" cy="6858000"/>
+          </a:xfrm>
+          <a:prstGeom prst="rect">
+            <a:avLst/>
+          </a:prstGeom>
+        </p:spPr>
+      </p:pic>
     </p:spTree>
     <p:extLst>
       <p:ext uri="{BB962C8B-B14F-4D97-AF65-F5344CB8AC3E}">
-        <p14:creationId xmlns:p14="http://schemas.microsoft.com/office/powerpoint/2010/main" val="1500148518"/>
+        <p14:creationId xmlns:p14="http://schemas.microsoft.com/office/powerpoint/2010/main" val="1415314910"/>
       </p:ext>
     </p:extLst>
   </p:cSld>
@@ -9578,7 +9268,10 @@
           <a:bodyPr/>
           <a:lstStyle/>
           <a:p>
-            <a:endParaRPr lang="en-US"/>
+            <a:r>
+              <a:rPr lang="en-US" dirty="0"/>
+              <a:t>What is version control</a:t>
+            </a:r>
           </a:p>
         </p:txBody>
       </p:sp>
@@ -9597,38 +9290,94 @@
           <a:bodyPr/>
           <a:lstStyle/>
           <a:p>
-            <a:endParaRPr lang="en-US"/>
-          </a:p>
-        </p:txBody>
-      </p:sp>
-      <p:pic>
-        <p:nvPicPr>
-          <p:cNvPr id="4" name="Picture 3"/>
-          <p:cNvPicPr>
-            <a:picLocks noChangeAspect="1"/>
-          </p:cNvPicPr>
-          <p:nvPr/>
-        </p:nvPicPr>
-        <p:blipFill>
-          <a:blip r:embed="rId2"/>
-          <a:stretch>
-            <a:fillRect/>
-          </a:stretch>
-        </p:blipFill>
-        <p:spPr>
-          <a:xfrm>
-            <a:off x="2000250" y="0"/>
-            <a:ext cx="5143500" cy="6858000"/>
-          </a:xfrm>
-          <a:prstGeom prst="rect">
-            <a:avLst/>
-          </a:prstGeom>
-        </p:spPr>
-      </p:pic>
+            <a:pPr>
+              <a:spcBef>
+                <a:spcPts val="800"/>
+              </a:spcBef>
+              <a:buFont typeface="Arial" charset="0"/>
+              <a:buChar char="•"/>
+              <a:defRPr/>
+            </a:pPr>
+            <a:r>
+              <a:rPr lang="is-IS" dirty="0">
+                <a:latin typeface="Calibri" charset="0"/>
+              </a:rPr>
+              <a:t>Version control is like a combination of undo and track changes for your code</a:t>
+            </a:r>
+          </a:p>
+          <a:p>
+            <a:pPr lvl="1">
+              <a:spcBef>
+                <a:spcPts val="800"/>
+              </a:spcBef>
+              <a:buFont typeface="Arial" charset="0"/>
+              <a:buChar char="•"/>
+              <a:defRPr/>
+            </a:pPr>
+            <a:r>
+              <a:rPr lang="is-IS" sz="3200" dirty="0">
+                <a:latin typeface="Calibri" charset="0"/>
+              </a:rPr>
+              <a:t>You can revert to previous versions of code</a:t>
+            </a:r>
+          </a:p>
+          <a:p>
+            <a:pPr lvl="1">
+              <a:spcBef>
+                <a:spcPts val="800"/>
+              </a:spcBef>
+              <a:buFont typeface="Arial" charset="0"/>
+              <a:buChar char="•"/>
+              <a:defRPr/>
+            </a:pPr>
+            <a:r>
+              <a:rPr lang="is-IS" sz="3200" dirty="0">
+                <a:latin typeface="Calibri" charset="0"/>
+              </a:rPr>
+              <a:t>You can easily identify who contributed what</a:t>
+            </a:r>
+          </a:p>
+          <a:p>
+            <a:pPr lvl="1">
+              <a:spcBef>
+                <a:spcPts val="800"/>
+              </a:spcBef>
+              <a:buFont typeface="Arial" charset="0"/>
+              <a:buChar char="•"/>
+              <a:defRPr/>
+            </a:pPr>
+            <a:endParaRPr lang="is-IS" sz="3200" dirty="0">
+              <a:latin typeface="Calibri" charset="0"/>
+            </a:endParaRPr>
+          </a:p>
+          <a:p>
+            <a:pPr lvl="1">
+              <a:spcBef>
+                <a:spcPts val="800"/>
+              </a:spcBef>
+              <a:buFont typeface="Arial" charset="0"/>
+              <a:buChar char="•"/>
+              <a:defRPr/>
+            </a:pPr>
+            <a:r>
+              <a:rPr lang="is-IS" sz="3200" dirty="0">
+                <a:latin typeface="Calibri" charset="0"/>
+              </a:rPr>
+              <a:t>Version control is about tracking versions of code and developing software with people</a:t>
+            </a:r>
+            <a:endParaRPr lang="en-US" sz="3200" dirty="0">
+              <a:latin typeface="Calibri" charset="0"/>
+            </a:endParaRPr>
+          </a:p>
+          <a:p>
+            <a:endParaRPr lang="en-US" dirty="0"/>
+          </a:p>
+        </p:txBody>
+      </p:sp>
     </p:spTree>
     <p:extLst>
       <p:ext uri="{BB962C8B-B14F-4D97-AF65-F5344CB8AC3E}">
-        <p14:creationId xmlns:p14="http://schemas.microsoft.com/office/powerpoint/2010/main" val="1415314910"/>
+        <p14:creationId xmlns:p14="http://schemas.microsoft.com/office/powerpoint/2010/main" val="1380445033"/>
       </p:ext>
     </p:extLst>
   </p:cSld>
@@ -9672,114 +9421,41 @@
           <a:p>
             <a:r>
               <a:rPr lang="en-US" dirty="0"/>
-              <a:t>What is version control</a:t>
-            </a:r>
-          </a:p>
-        </p:txBody>
-      </p:sp>
-      <p:sp>
-        <p:nvSpPr>
-          <p:cNvPr id="3" name="Content Placeholder 2"/>
-          <p:cNvSpPr>
-            <a:spLocks noGrp="1"/>
-          </p:cNvSpPr>
+              <a:t>What is version control?</a:t>
+            </a:r>
+          </a:p>
+        </p:txBody>
+      </p:sp>
+      <p:pic>
+        <p:nvPicPr>
+          <p:cNvPr id="4" name="Content Placeholder 3"/>
+          <p:cNvPicPr>
+            <a:picLocks noGrp="1" noChangeAspect="1"/>
+          </p:cNvPicPr>
           <p:nvPr>
             <p:ph idx="1"/>
           </p:nvPr>
-        </p:nvSpPr>
-        <p:spPr/>
-        <p:txBody>
-          <a:bodyPr/>
-          <a:lstStyle/>
-          <a:p>
-            <a:pPr>
-              <a:spcBef>
-                <a:spcPts val="800"/>
-              </a:spcBef>
-              <a:buFont typeface="Arial" charset="0"/>
-              <a:buChar char="•"/>
-              <a:defRPr/>
-            </a:pPr>
-            <a:r>
-              <a:rPr lang="is-IS" dirty="0">
-                <a:latin typeface="Calibri" charset="0"/>
-              </a:rPr>
-              <a:t>Version control is like a combination of undo and track changes for your code</a:t>
-            </a:r>
-          </a:p>
-          <a:p>
-            <a:pPr lvl="1">
-              <a:spcBef>
-                <a:spcPts val="800"/>
-              </a:spcBef>
-              <a:buFont typeface="Arial" charset="0"/>
-              <a:buChar char="•"/>
-              <a:defRPr/>
-            </a:pPr>
-            <a:r>
-              <a:rPr lang="is-IS" sz="3200" dirty="0">
-                <a:latin typeface="Calibri" charset="0"/>
-              </a:rPr>
-              <a:t>You can revert to previous versions of code</a:t>
-            </a:r>
-          </a:p>
-          <a:p>
-            <a:pPr lvl="1">
-              <a:spcBef>
-                <a:spcPts val="800"/>
-              </a:spcBef>
-              <a:buFont typeface="Arial" charset="0"/>
-              <a:buChar char="•"/>
-              <a:defRPr/>
-            </a:pPr>
-            <a:r>
-              <a:rPr lang="is-IS" sz="3200" dirty="0">
-                <a:latin typeface="Calibri" charset="0"/>
-              </a:rPr>
-              <a:t>You can easily identify who contributed what</a:t>
-            </a:r>
-          </a:p>
-          <a:p>
-            <a:pPr lvl="1">
-              <a:spcBef>
-                <a:spcPts val="800"/>
-              </a:spcBef>
-              <a:buFont typeface="Arial" charset="0"/>
-              <a:buChar char="•"/>
-              <a:defRPr/>
-            </a:pPr>
-            <a:endParaRPr lang="is-IS" sz="3200" dirty="0">
-              <a:latin typeface="Calibri" charset="0"/>
-            </a:endParaRPr>
-          </a:p>
-          <a:p>
-            <a:pPr lvl="1">
-              <a:spcBef>
-                <a:spcPts val="800"/>
-              </a:spcBef>
-              <a:buFont typeface="Arial" charset="0"/>
-              <a:buChar char="•"/>
-              <a:defRPr/>
-            </a:pPr>
-            <a:r>
-              <a:rPr lang="is-IS" sz="3200" dirty="0">
-                <a:latin typeface="Calibri" charset="0"/>
-              </a:rPr>
-              <a:t>Version control is about tracking versions of code and developing software with people</a:t>
-            </a:r>
-            <a:endParaRPr lang="en-US" sz="3200" dirty="0">
-              <a:latin typeface="Calibri" charset="0"/>
-            </a:endParaRPr>
-          </a:p>
-          <a:p>
-            <a:endParaRPr lang="en-US" dirty="0"/>
-          </a:p>
-        </p:txBody>
-      </p:sp>
+        </p:nvPicPr>
+        <p:blipFill>
+          <a:blip r:embed="rId2"/>
+          <a:stretch>
+            <a:fillRect/>
+          </a:stretch>
+        </p:blipFill>
+        <p:spPr>
+          <a:xfrm>
+            <a:off x="895350" y="2820987"/>
+            <a:ext cx="7353300" cy="2616200"/>
+          </a:xfrm>
+          <a:prstGeom prst="rect">
+            <a:avLst/>
+          </a:prstGeom>
+        </p:spPr>
+      </p:pic>
     </p:spTree>
     <p:extLst>
       <p:ext uri="{BB962C8B-B14F-4D97-AF65-F5344CB8AC3E}">
-        <p14:creationId xmlns:p14="http://schemas.microsoft.com/office/powerpoint/2010/main" val="1380445033"/>
+        <p14:creationId xmlns:p14="http://schemas.microsoft.com/office/powerpoint/2010/main" val="1249623642"/>
       </p:ext>
     </p:extLst>
   </p:cSld>
@@ -9823,20 +9499,101 @@
           <a:p>
             <a:r>
               <a:rPr lang="en-US" dirty="0"/>
-              <a:t>What is version control?</a:t>
-            </a:r>
+              <a:t>Why do I need version control?</a:t>
+            </a:r>
+          </a:p>
+        </p:txBody>
+      </p:sp>
+      <p:sp>
+        <p:nvSpPr>
+          <p:cNvPr id="3" name="Content Placeholder 2"/>
+          <p:cNvSpPr>
+            <a:spLocks noGrp="1"/>
+          </p:cNvSpPr>
+          <p:nvPr>
+            <p:ph idx="1"/>
+          </p:nvPr>
+        </p:nvSpPr>
+        <p:spPr/>
+        <p:txBody>
+          <a:bodyPr/>
+          <a:lstStyle/>
+          <a:p>
+            <a:pPr>
+              <a:spcBef>
+                <a:spcPts val="800"/>
+              </a:spcBef>
+              <a:buFont typeface="Arial" charset="0"/>
+              <a:buChar char="•"/>
+              <a:defRPr/>
+            </a:pPr>
+            <a:r>
+              <a:rPr lang="en-US" dirty="0">
+                <a:latin typeface="Calibri" charset="0"/>
+              </a:rPr>
+              <a:t>You have a working piece of software</a:t>
+            </a:r>
+          </a:p>
+          <a:p>
+            <a:pPr lvl="1">
+              <a:spcBef>
+                <a:spcPts val="800"/>
+              </a:spcBef>
+              <a:buFont typeface="Arial" charset="0"/>
+              <a:buChar char="•"/>
+              <a:defRPr/>
+            </a:pPr>
+            <a:r>
+              <a:rPr lang="en-US" sz="3200" dirty="0">
+                <a:latin typeface="Calibri" charset="0"/>
+              </a:rPr>
+              <a:t>You add some new features</a:t>
+            </a:r>
+          </a:p>
+          <a:p>
+            <a:pPr lvl="1">
+              <a:spcBef>
+                <a:spcPts val="800"/>
+              </a:spcBef>
+              <a:buFont typeface="Arial" charset="0"/>
+              <a:buChar char="•"/>
+              <a:defRPr/>
+            </a:pPr>
+            <a:r>
+              <a:rPr lang="en-US" sz="3200" dirty="0">
+                <a:latin typeface="Calibri" charset="0"/>
+              </a:rPr>
+              <a:t>Everything is broken</a:t>
+            </a:r>
+          </a:p>
+          <a:p>
+            <a:pPr lvl="1">
+              <a:spcBef>
+                <a:spcPts val="800"/>
+              </a:spcBef>
+              <a:buFont typeface="Arial" charset="0"/>
+              <a:buChar char="•"/>
+              <a:defRPr/>
+            </a:pPr>
+            <a:r>
+              <a:rPr lang="en-US" sz="3200" dirty="0">
+                <a:latin typeface="Calibri" charset="0"/>
+              </a:rPr>
+              <a:t>You want to revert to the last known working version</a:t>
+            </a:r>
+          </a:p>
+          <a:p>
+            <a:endParaRPr lang="en-US" dirty="0"/>
           </a:p>
         </p:txBody>
       </p:sp>
       <p:pic>
         <p:nvPicPr>
-          <p:cNvPr id="4" name="Content Placeholder 3"/>
+          <p:cNvPr id="4" name="Picture 3"/>
           <p:cNvPicPr>
-            <a:picLocks noGrp="1" noChangeAspect="1"/>
+            <a:picLocks noChangeAspect="1"/>
           </p:cNvPicPr>
-          <p:nvPr>
-            <p:ph idx="1"/>
-          </p:nvPr>
+          <p:nvPr/>
         </p:nvPicPr>
         <p:blipFill>
           <a:blip r:embed="rId2"/>
@@ -9846,24 +9603,141 @@
         </p:blipFill>
         <p:spPr>
           <a:xfrm>
-            <a:off x="895350" y="2820987"/>
-            <a:ext cx="7353300" cy="2616200"/>
+            <a:off x="1828800" y="4503010"/>
+            <a:ext cx="5257800" cy="1870651"/>
           </a:xfrm>
           <a:prstGeom prst="rect">
             <a:avLst/>
           </a:prstGeom>
         </p:spPr>
       </p:pic>
+      <p:cxnSp>
+        <p:nvCxnSpPr>
+          <p:cNvPr id="5" name="Straight Arrow Connector 4"/>
+          <p:cNvCxnSpPr/>
+          <p:nvPr/>
+        </p:nvCxnSpPr>
+        <p:spPr bwMode="auto">
+          <a:xfrm flipH="1">
+            <a:off x="5029200" y="5188810"/>
+            <a:ext cx="1447800" cy="0"/>
+          </a:xfrm>
+          <a:prstGeom prst="straightConnector1">
+            <a:avLst/>
+          </a:prstGeom>
+          <a:solidFill>
+            <a:srgbClr val="00B8FF"/>
+          </a:solidFill>
+          <a:ln w="76200" cap="flat" cmpd="sng" algn="ctr">
+            <a:solidFill>
+              <a:srgbClr val="FF0000"/>
+            </a:solidFill>
+            <a:prstDash val="solid"/>
+            <a:round/>
+            <a:headEnd type="none" w="med" len="med"/>
+            <a:tailEnd type="arrow"/>
+          </a:ln>
+          <a:effectLst/>
+          <a:extLst>
+            <a:ext uri="{AF507438-7753-43e0-B8FC-AC1667EBCBE1}">
+              <a14:hiddenEffects xmlns:a14="http://schemas.microsoft.com/office/drawing/2010/main" xmlns="">
+                <a:effectLst>
+                  <a:outerShdw blurRad="63500" dist="38099" dir="2700000" algn="ctr" rotWithShape="0">
+                    <a:schemeClr val="bg2">
+                      <a:alpha val="74998"/>
+                    </a:schemeClr>
+                  </a:outerShdw>
+                </a:effectLst>
+              </a14:hiddenEffects>
+            </a:ext>
+          </a:extLst>
+        </p:spPr>
+      </p:cxnSp>
     </p:spTree>
     <p:extLst>
       <p:ext uri="{BB962C8B-B14F-4D97-AF65-F5344CB8AC3E}">
-        <p14:creationId xmlns:p14="http://schemas.microsoft.com/office/powerpoint/2010/main" val="1249623642"/>
+        <p14:creationId xmlns:p14="http://schemas.microsoft.com/office/powerpoint/2010/main" val="1241212164"/>
       </p:ext>
     </p:extLst>
   </p:cSld>
   <p:clrMapOvr>
     <a:masterClrMapping/>
   </p:clrMapOvr>
+  <p:timing>
+    <p:tnLst>
+      <p:par>
+        <p:cTn id="1" dur="indefinite" restart="never" nodeType="tmRoot">
+          <p:childTnLst>
+            <p:seq concurrent="1" nextAc="seek">
+              <p:cTn id="2" dur="indefinite" nodeType="mainSeq">
+                <p:childTnLst>
+                  <p:par>
+                    <p:cTn id="3" fill="hold">
+                      <p:stCondLst>
+                        <p:cond delay="indefinite"/>
+                      </p:stCondLst>
+                      <p:childTnLst>
+                        <p:par>
+                          <p:cTn id="4" fill="hold">
+                            <p:stCondLst>
+                              <p:cond delay="0"/>
+                            </p:stCondLst>
+                            <p:childTnLst>
+                              <p:par>
+                                <p:cTn id="5" presetID="1" presetClass="entr" presetSubtype="0" fill="hold" nodeType="clickEffect">
+                                  <p:stCondLst>
+                                    <p:cond delay="0"/>
+                                  </p:stCondLst>
+                                  <p:childTnLst>
+                                    <p:set>
+                                      <p:cBhvr>
+                                        <p:cTn id="6" dur="1" fill="hold">
+                                          <p:stCondLst>
+                                            <p:cond delay="0"/>
+                                          </p:stCondLst>
+                                        </p:cTn>
+                                        <p:tgtEl>
+                                          <p:spTgt spid="4"/>
+                                        </p:tgtEl>
+                                        <p:attrNameLst>
+                                          <p:attrName>style.visibility</p:attrName>
+                                        </p:attrNameLst>
+                                      </p:cBhvr>
+                                      <p:to>
+                                        <p:strVal val="visible"/>
+                                      </p:to>
+                                    </p:set>
+                                  </p:childTnLst>
+                                </p:cTn>
+                              </p:par>
+                            </p:childTnLst>
+                          </p:cTn>
+                        </p:par>
+                      </p:childTnLst>
+                    </p:cTn>
+                  </p:par>
+                </p:childTnLst>
+              </p:cTn>
+              <p:prevCondLst>
+                <p:cond evt="onPrev" delay="0">
+                  <p:tgtEl>
+                    <p:sldTgt/>
+                  </p:tgtEl>
+                </p:cond>
+              </p:prevCondLst>
+              <p:nextCondLst>
+                <p:cond evt="onNext" delay="0">
+                  <p:tgtEl>
+                    <p:sldTgt/>
+                  </p:tgtEl>
+                </p:cond>
+              </p:nextCondLst>
+            </p:seq>
+          </p:childTnLst>
+        </p:cTn>
+      </p:par>
+    </p:tnLst>
+  </p:timing>
 </p:sld>
 </file>
 

</xml_diff>